<commit_message>
added results, changed presentation
</commit_message>
<xml_diff>
--- a/project_3_team_E/Final Presentation.pptx
+++ b/project_3_team_E/Final Presentation.pptx
@@ -221,7 +221,7 @@
           <a:p>
             <a:fld id="{05E02316-A3A9-40CE-8399-988D8D269502}" type="datetimeFigureOut">
               <a:rPr lang="de-AT" smtClean="0"/>
-              <a:t>16.01.2024</a:t>
+              <a:t>17.01.2024</a:t>
             </a:fld>
             <a:endParaRPr lang="de-AT"/>
           </a:p>
@@ -287,7 +287,7 @@
           <a:p>
             <a:fld id="{5C731D18-B53C-4622-9947-A3FBDDB0C9B1}" type="slidenum">
               <a:rPr lang="de-AT" smtClean="0"/>
-              <a:t>‹#›</a:t>
+              <a:t>‹Nr.›</a:t>
             </a:fld>
             <a:endParaRPr lang="de-AT"/>
           </a:p>
@@ -386,7 +386,7 @@
           <a:p>
             <a:fld id="{F5E89DEF-C035-41A2-9AFE-A6026D4C04BE}" type="datetimeFigureOut">
               <a:rPr lang="de-AT" smtClean="0"/>
-              <a:t>16.01.2024</a:t>
+              <a:t>17.01.2024</a:t>
             </a:fld>
             <a:endParaRPr lang="de-AT"/>
           </a:p>
@@ -545,7 +545,7 @@
           <a:p>
             <a:fld id="{BEF2A079-E7F8-4A78-8EEA-DD00A8D5DE37}" type="slidenum">
               <a:rPr lang="de-AT" smtClean="0"/>
-              <a:t>‹#›</a:t>
+              <a:t>‹Nr.›</a:t>
             </a:fld>
             <a:endParaRPr lang="de-AT"/>
           </a:p>
@@ -1037,7 +1037,7 @@
             <a:fld id="{2E1B1CB6-5C5C-443C-B788-F7ADFC29778E}" type="slidenum">
               <a:rPr lang="en-US" smtClean="0"/>
               <a:pPr/>
-              <a:t>‹#›</a:t>
+              <a:t>‹Nr.›</a:t>
             </a:fld>
             <a:endParaRPr lang="en-US" dirty="0"/>
           </a:p>
@@ -1296,7 +1296,7 @@
             <a:fld id="{2E1B1CB6-5C5C-443C-B788-F7ADFC29778E}" type="slidenum">
               <a:rPr lang="en-US" smtClean="0"/>
               <a:pPr/>
-              <a:t>‹#›</a:t>
+              <a:t>‹Nr.›</a:t>
             </a:fld>
             <a:endParaRPr lang="en-US" dirty="0"/>
           </a:p>
@@ -1546,7 +1546,7 @@
             <a:fld id="{2E1B1CB6-5C5C-443C-B788-F7ADFC29778E}" type="slidenum">
               <a:rPr lang="en-US" smtClean="0"/>
               <a:pPr/>
-              <a:t>‹#›</a:t>
+              <a:t>‹Nr.›</a:t>
             </a:fld>
             <a:endParaRPr lang="en-US" dirty="0"/>
           </a:p>
@@ -1947,7 +1947,7 @@
             <a:fld id="{2E1B1CB6-5C5C-443C-B788-F7ADFC29778E}" type="slidenum">
               <a:rPr lang="en-US" smtClean="0"/>
               <a:pPr/>
-              <a:t>‹#›</a:t>
+              <a:t>‹Nr.›</a:t>
             </a:fld>
             <a:endParaRPr lang="en-US" dirty="0"/>
           </a:p>
@@ -2195,7 +2195,7 @@
             <a:fld id="{2E1B1CB6-5C5C-443C-B788-F7ADFC29778E}" type="slidenum">
               <a:rPr lang="en-US" smtClean="0"/>
               <a:pPr/>
-              <a:t>‹#›</a:t>
+              <a:t>‹Nr.›</a:t>
             </a:fld>
             <a:endParaRPr lang="en-US" dirty="0"/>
           </a:p>
@@ -2385,7 +2385,7 @@
             <a:fld id="{2E1B1CB6-5C5C-443C-B788-F7ADFC29778E}" type="slidenum">
               <a:rPr lang="en-US" smtClean="0"/>
               <a:pPr/>
-              <a:t>‹#›</a:t>
+              <a:t>‹Nr.›</a:t>
             </a:fld>
             <a:endParaRPr lang="en-US" dirty="0"/>
           </a:p>
@@ -3198,7 +3198,7 @@
             <a:fld id="{2E1B1CB6-5C5C-443C-B788-F7ADFC29778E}" type="slidenum">
               <a:rPr lang="en-US" smtClean="0"/>
               <a:pPr/>
-              <a:t>‹#›</a:t>
+              <a:t>‹Nr.›</a:t>
             </a:fld>
             <a:endParaRPr lang="en-US" dirty="0"/>
           </a:p>
@@ -4448,7 +4448,7 @@
             <a:fld id="{2E1B1CB6-5C5C-443C-B788-F7ADFC29778E}" type="slidenum">
               <a:rPr lang="en-US" smtClean="0"/>
               <a:pPr/>
-              <a:t>‹#›</a:t>
+              <a:t>‹Nr.›</a:t>
             </a:fld>
             <a:endParaRPr lang="en-US" dirty="0"/>
           </a:p>
@@ -5280,7 +5280,7 @@
             <a:fld id="{2E1B1CB6-5C5C-443C-B788-F7ADFC29778E}" type="slidenum">
               <a:rPr lang="en-US" smtClean="0"/>
               <a:pPr/>
-              <a:t>‹#›</a:t>
+              <a:t>‹Nr.›</a:t>
             </a:fld>
             <a:endParaRPr lang="en-US" dirty="0"/>
           </a:p>
@@ -6112,7 +6112,7 @@
             <a:fld id="{2E1B1CB6-5C5C-443C-B788-F7ADFC29778E}" type="slidenum">
               <a:rPr lang="en-US" smtClean="0"/>
               <a:pPr/>
-              <a:t>‹#›</a:t>
+              <a:t>‹Nr.›</a:t>
             </a:fld>
             <a:endParaRPr lang="en-US" dirty="0"/>
           </a:p>
@@ -6889,7 +6889,7 @@
             <a:fld id="{2E1B1CB6-5C5C-443C-B788-F7ADFC29778E}" type="slidenum">
               <a:rPr lang="en-US" smtClean="0"/>
               <a:pPr/>
-              <a:t>‹#›</a:t>
+              <a:t>‹Nr.›</a:t>
             </a:fld>
             <a:endParaRPr lang="en-US" dirty="0"/>
           </a:p>
@@ -7218,7 +7218,7 @@
             <a:fld id="{2E1B1CB6-5C5C-443C-B788-F7ADFC29778E}" type="slidenum">
               <a:rPr lang="en-US" smtClean="0"/>
               <a:pPr/>
-              <a:t>‹#›</a:t>
+              <a:t>‹Nr.›</a:t>
             </a:fld>
             <a:endParaRPr lang="en-US" dirty="0"/>
           </a:p>
@@ -7334,7 +7334,7 @@
             <a:fld id="{2E1B1CB6-5C5C-443C-B788-F7ADFC29778E}" type="slidenum">
               <a:rPr lang="en-US" smtClean="0"/>
               <a:pPr/>
-              <a:t>‹#›</a:t>
+              <a:t>‹Nr.›</a:t>
             </a:fld>
             <a:endParaRPr lang="en-US" dirty="0"/>
           </a:p>
@@ -8121,7 +8121,7 @@
             <a:fld id="{2E1B1CB6-5C5C-443C-B788-F7ADFC29778E}" type="slidenum">
               <a:rPr lang="en-US" smtClean="0"/>
               <a:pPr/>
-              <a:t>‹#›</a:t>
+              <a:t>‹Nr.›</a:t>
             </a:fld>
             <a:endParaRPr lang="en-US" dirty="0"/>
           </a:p>
@@ -8312,7 +8312,7 @@
             <a:fld id="{2E1B1CB6-5C5C-443C-B788-F7ADFC29778E}" type="slidenum">
               <a:rPr lang="en-US" smtClean="0"/>
               <a:pPr/>
-              <a:t>‹#›</a:t>
+              <a:t>‹Nr.›</a:t>
             </a:fld>
             <a:endParaRPr lang="en-US" dirty="0"/>
           </a:p>
@@ -8510,7 +8510,7 @@
             <a:fld id="{2E1B1CB6-5C5C-443C-B788-F7ADFC29778E}" type="slidenum">
               <a:rPr lang="en-US" smtClean="0"/>
               <a:pPr/>
-              <a:t>‹#›</a:t>
+              <a:t>‹Nr.›</a:t>
             </a:fld>
             <a:endParaRPr lang="en-US" dirty="0"/>
           </a:p>
@@ -8830,7 +8830,7 @@
             <a:fld id="{2E1B1CB6-5C5C-443C-B788-F7ADFC29778E}" type="slidenum">
               <a:rPr lang="en-US" smtClean="0"/>
               <a:pPr/>
-              <a:t>‹#›</a:t>
+              <a:t>‹Nr.›</a:t>
             </a:fld>
             <a:endParaRPr lang="en-US" dirty="0"/>
           </a:p>
@@ -9173,7 +9173,7 @@
             <a:fld id="{2E1B1CB6-5C5C-443C-B788-F7ADFC29778E}" type="slidenum">
               <a:rPr lang="en-US" smtClean="0"/>
               <a:pPr/>
-              <a:t>‹#›</a:t>
+              <a:t>‹Nr.›</a:t>
             </a:fld>
             <a:endParaRPr lang="en-US" dirty="0"/>
           </a:p>
@@ -9424,7 +9424,7 @@
             <a:fld id="{2E1B1CB6-5C5C-443C-B788-F7ADFC29778E}" type="slidenum">
               <a:rPr lang="en-US" smtClean="0"/>
               <a:pPr/>
-              <a:t>‹#›</a:t>
+              <a:t>‹Nr.›</a:t>
             </a:fld>
             <a:endParaRPr lang="en-US" dirty="0"/>
           </a:p>
@@ -9835,7 +9835,7 @@
 </file>
 
 <file path=ppt/slides/slide10.xml><?xml version="1.0" encoding="utf-8"?>
-<p:sld xmlns:a="http://schemas.openxmlformats.org/drawingml/2006/main" xmlns:r="http://schemas.openxmlformats.org/officeDocument/2006/relationships" xmlns:p="http://schemas.openxmlformats.org/presentationml/2006/main">
+<p:sld xmlns:a="http://schemas.openxmlformats.org/drawingml/2006/main" xmlns:r="http://schemas.openxmlformats.org/officeDocument/2006/relationships" xmlns:p="http://schemas.openxmlformats.org/presentationml/2006/main" show="0">
   <p:cSld>
     <p:spTree>
       <p:nvGrpSpPr>
@@ -11279,7 +11279,7 @@
 </file>
 
 <file path=ppt/slides/slide12.xml><?xml version="1.0" encoding="utf-8"?>
-<p:sld xmlns:a="http://schemas.openxmlformats.org/drawingml/2006/main" xmlns:r="http://schemas.openxmlformats.org/officeDocument/2006/relationships" xmlns:p="http://schemas.openxmlformats.org/presentationml/2006/main">
+<p:sld xmlns:a="http://schemas.openxmlformats.org/drawingml/2006/main" xmlns:r="http://schemas.openxmlformats.org/officeDocument/2006/relationships" xmlns:p="http://schemas.openxmlformats.org/presentationml/2006/main" show="0">
   <p:cSld>
     <p:spTree>
       <p:nvGrpSpPr>
@@ -12564,7 +12564,7 @@
 </file>
 
 <file path=ppt/slides/slide13.xml><?xml version="1.0" encoding="utf-8"?>
-<p:sld xmlns:a="http://schemas.openxmlformats.org/drawingml/2006/main" xmlns:r="http://schemas.openxmlformats.org/officeDocument/2006/relationships" xmlns:p="http://schemas.openxmlformats.org/presentationml/2006/main">
+<p:sld xmlns:a="http://schemas.openxmlformats.org/drawingml/2006/main" xmlns:r="http://schemas.openxmlformats.org/officeDocument/2006/relationships" xmlns:p="http://schemas.openxmlformats.org/presentationml/2006/main" show="0">
   <p:cSld>
     <p:spTree>
       <p:nvGrpSpPr>
@@ -13857,7 +13857,7 @@
 </file>
 
 <file path=ppt/slides/slide14.xml><?xml version="1.0" encoding="utf-8"?>
-<p:sld xmlns:a="http://schemas.openxmlformats.org/drawingml/2006/main" xmlns:r="http://schemas.openxmlformats.org/officeDocument/2006/relationships" xmlns:p="http://schemas.openxmlformats.org/presentationml/2006/main">
+<p:sld xmlns:a="http://schemas.openxmlformats.org/drawingml/2006/main" xmlns:r="http://schemas.openxmlformats.org/officeDocument/2006/relationships" xmlns:p="http://schemas.openxmlformats.org/presentationml/2006/main" show="0">
   <p:cSld>
     <p:spTree>
       <p:nvGrpSpPr>
@@ -15194,7 +15194,7 @@
         <p:spPr>
           <a:xfrm>
             <a:off x="746620" y="1249960"/>
-            <a:ext cx="8800052" cy="2031325"/>
+            <a:ext cx="8800052" cy="1477328"/>
           </a:xfrm>
           <a:prstGeom prst="rect">
             <a:avLst/>
@@ -15234,75 +15234,6 @@
             <a:endParaRPr lang="de-DE" dirty="0"/>
           </a:p>
           <a:p>
-            <a:pPr marL="285750" indent="-285750">
-              <a:buFont typeface="Arial" panose="020B0604020202020204" pitchFamily="34" charset="0"/>
-              <a:buChar char="•"/>
-            </a:pPr>
-            <a:endParaRPr lang="de-DE" dirty="0"/>
-          </a:p>
-          <a:p>
-            <a:r>
-              <a:rPr lang="de-DE" dirty="0">
-                <a:solidFill>
-                  <a:srgbClr val="FF0000"/>
-                </a:solidFill>
-              </a:rPr>
-              <a:t>TODO: </a:t>
-            </a:r>
-            <a:r>
-              <a:rPr lang="de-DE" dirty="0" err="1">
-                <a:solidFill>
-                  <a:srgbClr val="FF0000"/>
-                </a:solidFill>
-              </a:rPr>
-              <a:t>write</a:t>
-            </a:r>
-            <a:r>
-              <a:rPr lang="de-DE" dirty="0">
-                <a:solidFill>
-                  <a:srgbClr val="FF0000"/>
-                </a:solidFill>
-              </a:rPr>
-              <a:t> </a:t>
-            </a:r>
-            <a:r>
-              <a:rPr lang="de-DE" dirty="0" err="1">
-                <a:solidFill>
-                  <a:srgbClr val="FF0000"/>
-                </a:solidFill>
-              </a:rPr>
-              <a:t>something</a:t>
-            </a:r>
-            <a:r>
-              <a:rPr lang="de-DE" dirty="0">
-                <a:solidFill>
-                  <a:srgbClr val="FF0000"/>
-                </a:solidFill>
-              </a:rPr>
-              <a:t> </a:t>
-            </a:r>
-            <a:r>
-              <a:rPr lang="de-DE" dirty="0" err="1">
-                <a:solidFill>
-                  <a:srgbClr val="FF0000"/>
-                </a:solidFill>
-              </a:rPr>
-              <a:t>about</a:t>
-            </a:r>
-            <a:r>
-              <a:rPr lang="de-DE" dirty="0">
-                <a:solidFill>
-                  <a:srgbClr val="FF0000"/>
-                </a:solidFill>
-              </a:rPr>
-              <a:t> vgg19?</a:t>
-            </a:r>
-          </a:p>
-          <a:p>
-            <a:pPr marL="285750" indent="-285750">
-              <a:buFont typeface="Arial" panose="020B0604020202020204" pitchFamily="34" charset="0"/>
-              <a:buChar char="•"/>
-            </a:pPr>
             <a:endParaRPr lang="de-DE" dirty="0"/>
           </a:p>
           <a:p>
@@ -15384,7 +15315,7 @@
         <p:spPr>
           <a:xfrm>
             <a:off x="687897" y="1098958"/>
-            <a:ext cx="10234569" cy="2862322"/>
+            <a:ext cx="10234569" cy="3139321"/>
           </a:xfrm>
           <a:prstGeom prst="rect">
             <a:avLst/>
@@ -15629,16 +15560,13 @@
           <a:p>
             <a:r>
               <a:rPr lang="en-US" dirty="0"/>
-              <a:t>Late fusion: As a late fusion technique we used </a:t>
-            </a:r>
-            <a:r>
-              <a:rPr lang="en-US" dirty="0">
-                <a:solidFill>
-                  <a:srgbClr val="FF0000"/>
-                </a:solidFill>
-              </a:rPr>
-              <a:t>??</a:t>
-            </a:r>
+              <a:t>Late fusion: As a late fusion technique we calculated the cosine matrices of the two features and took a weighted sum to combine the two matrices</a:t>
+            </a:r>
+            <a:endParaRPr lang="en-US" dirty="0">
+              <a:solidFill>
+                <a:srgbClr val="FF0000"/>
+              </a:solidFill>
+            </a:endParaRPr>
           </a:p>
           <a:p>
             <a:endParaRPr lang="en-US" dirty="0"/>
@@ -15729,9 +15657,16 @@
             <p:ph type="title"/>
           </p:nvPr>
         </p:nvSpPr>
-        <p:spPr/>
+        <p:spPr>
+          <a:xfrm>
+            <a:off x="486000" y="575999"/>
+            <a:ext cx="11124000" cy="990000"/>
+          </a:xfrm>
+        </p:spPr>
         <p:txBody>
-          <a:bodyPr/>
+          <a:bodyPr vert="horz" lIns="91440" tIns="45720" rIns="91440" bIns="45720" rtlCol="0" anchor="t">
+            <a:normAutofit/>
+          </a:bodyPr>
           <a:lstStyle/>
           <a:p>
             <a:r>
@@ -15742,50 +15677,1998 @@
           </a:p>
         </p:txBody>
       </p:sp>
-      <p:sp>
-        <p:nvSpPr>
-          <p:cNvPr id="3" name="Textfeld 2">
+      <p:graphicFrame>
+        <p:nvGraphicFramePr>
+          <p:cNvPr id="4" name="Tabelle 3">
             <a:extLst>
               <a:ext uri="{FF2B5EF4-FFF2-40B4-BE49-F238E27FC236}">
-                <a16:creationId xmlns:a16="http://schemas.microsoft.com/office/drawing/2014/main" id="{5C936566-F12D-7973-6420-565C299B7CF2}"/>
+                <a16:creationId xmlns:a16="http://schemas.microsoft.com/office/drawing/2014/main" id="{6682410C-03BC-0D2B-7996-65E3905018D5}"/>
               </a:ext>
             </a:extLst>
           </p:cNvPr>
-          <p:cNvSpPr txBox="1"/>
-          <p:nvPr/>
-        </p:nvSpPr>
-        <p:spPr>
-          <a:xfrm>
-            <a:off x="713064" y="1224793"/>
-            <a:ext cx="10234569" cy="369332"/>
-          </a:xfrm>
-          <a:prstGeom prst="rect">
-            <a:avLst/>
-          </a:prstGeom>
-          <a:noFill/>
-        </p:spPr>
-        <p:txBody>
-          <a:bodyPr wrap="square" rtlCol="0">
-            <a:spAutoFit/>
-          </a:bodyPr>
-          <a:lstStyle/>
-          <a:p>
-            <a:r>
-              <a:rPr lang="en-US" dirty="0">
-                <a:solidFill>
-                  <a:srgbClr val="FF0000"/>
-                </a:solidFill>
-              </a:rPr>
-              <a:t>Todo: Insert Final Result Table</a:t>
-            </a:r>
-            <a:endParaRPr lang="de-DE" dirty="0">
-              <a:solidFill>
-                <a:srgbClr val="FF0000"/>
-              </a:solidFill>
-            </a:endParaRPr>
-          </a:p>
-        </p:txBody>
-      </p:sp>
+          <p:cNvGraphicFramePr>
+            <a:graphicFrameLocks noGrp="1"/>
+          </p:cNvGraphicFramePr>
+          <p:nvPr>
+            <p:extLst>
+              <p:ext uri="{D42A27DB-BD31-4B8C-83A1-F6EECF244321}">
+                <p14:modId xmlns:p14="http://schemas.microsoft.com/office/powerpoint/2010/main" val="3181501739"/>
+              </p:ext>
+            </p:extLst>
+          </p:nvPr>
+        </p:nvGraphicFramePr>
+        <p:xfrm>
+          <a:off x="1428411" y="1621584"/>
+          <a:ext cx="9224781" cy="4516755"/>
+        </p:xfrm>
+        <a:graphic>
+          <a:graphicData uri="http://schemas.openxmlformats.org/drawingml/2006/table">
+            <a:tbl>
+              <a:tblPr firstRow="1" firstCol="1" bandRow="1">
+                <a:tableStyleId>{5C22544A-7EE6-4342-B048-85BDC9FD1C3A}</a:tableStyleId>
+              </a:tblPr>
+              <a:tblGrid>
+                <a:gridCol w="1909458">
+                  <a:extLst>
+                    <a:ext uri="{9D8B030D-6E8A-4147-A177-3AD203B41FA5}">
+                      <a16:colId xmlns:a16="http://schemas.microsoft.com/office/drawing/2014/main" val="655536409"/>
+                    </a:ext>
+                  </a:extLst>
+                </a:gridCol>
+                <a:gridCol w="1319664">
+                  <a:extLst>
+                    <a:ext uri="{9D8B030D-6E8A-4147-A177-3AD203B41FA5}">
+                      <a16:colId xmlns:a16="http://schemas.microsoft.com/office/drawing/2014/main" val="876395964"/>
+                    </a:ext>
+                  </a:extLst>
+                </a:gridCol>
+                <a:gridCol w="1456121">
+                  <a:extLst>
+                    <a:ext uri="{9D8B030D-6E8A-4147-A177-3AD203B41FA5}">
+                      <a16:colId xmlns:a16="http://schemas.microsoft.com/office/drawing/2014/main" val="1746524061"/>
+                    </a:ext>
+                  </a:extLst>
+                </a:gridCol>
+                <a:gridCol w="1439366">
+                  <a:extLst>
+                    <a:ext uri="{9D8B030D-6E8A-4147-A177-3AD203B41FA5}">
+                      <a16:colId xmlns:a16="http://schemas.microsoft.com/office/drawing/2014/main" val="1771470205"/>
+                    </a:ext>
+                  </a:extLst>
+                </a:gridCol>
+                <a:gridCol w="1714156">
+                  <a:extLst>
+                    <a:ext uri="{9D8B030D-6E8A-4147-A177-3AD203B41FA5}">
+                      <a16:colId xmlns:a16="http://schemas.microsoft.com/office/drawing/2014/main" val="4162561683"/>
+                    </a:ext>
+                  </a:extLst>
+                </a:gridCol>
+                <a:gridCol w="1386016">
+                  <a:extLst>
+                    <a:ext uri="{9D8B030D-6E8A-4147-A177-3AD203B41FA5}">
+                      <a16:colId xmlns:a16="http://schemas.microsoft.com/office/drawing/2014/main" val="1613113071"/>
+                    </a:ext>
+                  </a:extLst>
+                </a:gridCol>
+              </a:tblGrid>
+              <a:tr h="424652">
+                <a:tc>
+                  <a:txBody>
+                    <a:bodyPr/>
+                    <a:lstStyle/>
+                    <a:p>
+                      <a:pPr algn="just"/>
+                      <a:r>
+                        <a:rPr lang="en-US" sz="1300" kern="100">
+                          <a:effectLst/>
+                        </a:rPr>
+                        <a:t> </a:t>
+                      </a:r>
+                      <a:endParaRPr lang="de-DE" sz="1100" kern="100">
+                        <a:effectLst/>
+                        <a:latin typeface="DengXian" panose="02010600030101010101" pitchFamily="2" charset="-122"/>
+                        <a:ea typeface="DengXian" panose="02010600030101010101" pitchFamily="2" charset="-122"/>
+                        <a:cs typeface="Arial" panose="020B0604020202020204" pitchFamily="34" charset="0"/>
+                      </a:endParaRPr>
+                    </a:p>
+                  </a:txBody>
+                  <a:tcPr marL="72384" marR="72384" marT="0" marB="0"/>
+                </a:tc>
+                <a:tc>
+                  <a:txBody>
+                    <a:bodyPr/>
+                    <a:lstStyle/>
+                    <a:p>
+                      <a:pPr algn="just"/>
+                      <a:r>
+                        <a:rPr lang="en-US" sz="1300" kern="100">
+                          <a:effectLst/>
+                        </a:rPr>
+                        <a:t>Avg. Precision@10</a:t>
+                      </a:r>
+                      <a:endParaRPr lang="de-DE" sz="1100" kern="100">
+                        <a:effectLst/>
+                        <a:latin typeface="DengXian" panose="02010600030101010101" pitchFamily="2" charset="-122"/>
+                        <a:ea typeface="DengXian" panose="02010600030101010101" pitchFamily="2" charset="-122"/>
+                        <a:cs typeface="Arial" panose="020B0604020202020204" pitchFamily="34" charset="0"/>
+                      </a:endParaRPr>
+                    </a:p>
+                  </a:txBody>
+                  <a:tcPr marL="72384" marR="72384" marT="0" marB="0"/>
+                </a:tc>
+                <a:tc>
+                  <a:txBody>
+                    <a:bodyPr/>
+                    <a:lstStyle/>
+                    <a:p>
+                      <a:pPr algn="just"/>
+                      <a:r>
+                        <a:rPr lang="en-US" sz="1300" kern="100">
+                          <a:effectLst/>
+                        </a:rPr>
+                        <a:t>Avg. Recall@10</a:t>
+                      </a:r>
+                      <a:endParaRPr lang="de-DE" sz="1100" kern="100">
+                        <a:effectLst/>
+                        <a:latin typeface="DengXian" panose="02010600030101010101" pitchFamily="2" charset="-122"/>
+                        <a:ea typeface="DengXian" panose="02010600030101010101" pitchFamily="2" charset="-122"/>
+                        <a:cs typeface="Arial" panose="020B0604020202020204" pitchFamily="34" charset="0"/>
+                      </a:endParaRPr>
+                    </a:p>
+                  </a:txBody>
+                  <a:tcPr marL="72384" marR="72384" marT="0" marB="0"/>
+                </a:tc>
+                <a:tc>
+                  <a:txBody>
+                    <a:bodyPr/>
+                    <a:lstStyle/>
+                    <a:p>
+                      <a:pPr algn="just"/>
+                      <a:r>
+                        <a:rPr lang="en-US" sz="1300" kern="100">
+                          <a:effectLst/>
+                        </a:rPr>
+                        <a:t>Avg. nDCG@10</a:t>
+                      </a:r>
+                      <a:endParaRPr lang="de-DE" sz="1100" kern="100">
+                        <a:effectLst/>
+                        <a:latin typeface="DengXian" panose="02010600030101010101" pitchFamily="2" charset="-122"/>
+                        <a:ea typeface="DengXian" panose="02010600030101010101" pitchFamily="2" charset="-122"/>
+                        <a:cs typeface="Arial" panose="020B0604020202020204" pitchFamily="34" charset="0"/>
+                      </a:endParaRPr>
+                    </a:p>
+                  </a:txBody>
+                  <a:tcPr marL="72384" marR="72384" marT="0" marB="0"/>
+                </a:tc>
+                <a:tc>
+                  <a:txBody>
+                    <a:bodyPr/>
+                    <a:lstStyle/>
+                    <a:p>
+                      <a:pPr algn="just"/>
+                      <a:r>
+                        <a:rPr lang="en-US" sz="1300" kern="100">
+                          <a:effectLst/>
+                        </a:rPr>
+                        <a:t>Avg. Coverage@10</a:t>
+                      </a:r>
+                      <a:endParaRPr lang="de-DE" sz="1100" kern="100">
+                        <a:effectLst/>
+                        <a:latin typeface="DengXian" panose="02010600030101010101" pitchFamily="2" charset="-122"/>
+                        <a:ea typeface="DengXian" panose="02010600030101010101" pitchFamily="2" charset="-122"/>
+                        <a:cs typeface="Arial" panose="020B0604020202020204" pitchFamily="34" charset="0"/>
+                      </a:endParaRPr>
+                    </a:p>
+                  </a:txBody>
+                  <a:tcPr marL="72384" marR="72384" marT="0" marB="0"/>
+                </a:tc>
+                <a:tc>
+                  <a:txBody>
+                    <a:bodyPr/>
+                    <a:lstStyle/>
+                    <a:p>
+                      <a:pPr algn="just"/>
+                      <a:r>
+                        <a:rPr lang="en-US" sz="1300" kern="100">
+                          <a:effectLst/>
+                        </a:rPr>
+                        <a:t>Avg. Diversity@10</a:t>
+                      </a:r>
+                      <a:endParaRPr lang="de-DE" sz="1100" kern="100">
+                        <a:effectLst/>
+                        <a:latin typeface="DengXian" panose="02010600030101010101" pitchFamily="2" charset="-122"/>
+                        <a:ea typeface="DengXian" panose="02010600030101010101" pitchFamily="2" charset="-122"/>
+                        <a:cs typeface="Arial" panose="020B0604020202020204" pitchFamily="34" charset="0"/>
+                      </a:endParaRPr>
+                    </a:p>
+                  </a:txBody>
+                  <a:tcPr marL="72384" marR="72384" marT="0" marB="0"/>
+                </a:tc>
+                <a:extLst>
+                  <a:ext uri="{0D108BD9-81ED-4DB2-BD59-A6C34878D82A}">
+                    <a16:rowId xmlns:a16="http://schemas.microsoft.com/office/drawing/2014/main" val="2940690830"/>
+                  </a:ext>
+                </a:extLst>
+              </a:tr>
+              <a:tr h="424652">
+                <a:tc>
+                  <a:txBody>
+                    <a:bodyPr/>
+                    <a:lstStyle/>
+                    <a:p>
+                      <a:pPr algn="just"/>
+                      <a:r>
+                        <a:rPr lang="en-US" sz="1300" kern="100">
+                          <a:effectLst/>
+                        </a:rPr>
+                        <a:t>Audio-based(cosine, mfcc_stats)</a:t>
+                      </a:r>
+                      <a:endParaRPr lang="de-DE" sz="1100" kern="100">
+                        <a:effectLst/>
+                        <a:latin typeface="DengXian" panose="02010600030101010101" pitchFamily="2" charset="-122"/>
+                        <a:ea typeface="DengXian" panose="02010600030101010101" pitchFamily="2" charset="-122"/>
+                        <a:cs typeface="Arial" panose="020B0604020202020204" pitchFamily="34" charset="0"/>
+                      </a:endParaRPr>
+                    </a:p>
+                  </a:txBody>
+                  <a:tcPr marL="72384" marR="72384" marT="0" marB="0"/>
+                </a:tc>
+                <a:tc>
+                  <a:txBody>
+                    <a:bodyPr/>
+                    <a:lstStyle/>
+                    <a:p>
+                      <a:pPr algn="just"/>
+                      <a:r>
+                        <a:rPr lang="en-US" sz="1300" kern="100">
+                          <a:effectLst/>
+                        </a:rPr>
+                        <a:t>0.4289</a:t>
+                      </a:r>
+                      <a:endParaRPr lang="de-DE" sz="1100" kern="100">
+                        <a:effectLst/>
+                        <a:latin typeface="DengXian" panose="02010600030101010101" pitchFamily="2" charset="-122"/>
+                        <a:ea typeface="DengXian" panose="02010600030101010101" pitchFamily="2" charset="-122"/>
+                        <a:cs typeface="Arial" panose="020B0604020202020204" pitchFamily="34" charset="0"/>
+                      </a:endParaRPr>
+                    </a:p>
+                  </a:txBody>
+                  <a:tcPr marL="72384" marR="72384" marT="0" marB="0"/>
+                </a:tc>
+                <a:tc>
+                  <a:txBody>
+                    <a:bodyPr/>
+                    <a:lstStyle/>
+                    <a:p>
+                      <a:pPr algn="just"/>
+                      <a:r>
+                        <a:rPr lang="en-US" sz="1300" kern="100">
+                          <a:effectLst/>
+                        </a:rPr>
+                        <a:t>0.0018</a:t>
+                      </a:r>
+                      <a:endParaRPr lang="de-DE" sz="1100" kern="100">
+                        <a:effectLst/>
+                        <a:latin typeface="DengXian" panose="02010600030101010101" pitchFamily="2" charset="-122"/>
+                        <a:ea typeface="DengXian" panose="02010600030101010101" pitchFamily="2" charset="-122"/>
+                        <a:cs typeface="Arial" panose="020B0604020202020204" pitchFamily="34" charset="0"/>
+                      </a:endParaRPr>
+                    </a:p>
+                  </a:txBody>
+                  <a:tcPr marL="72384" marR="72384" marT="0" marB="0"/>
+                </a:tc>
+                <a:tc>
+                  <a:txBody>
+                    <a:bodyPr/>
+                    <a:lstStyle/>
+                    <a:p>
+                      <a:pPr algn="just"/>
+                      <a:r>
+                        <a:rPr lang="en-US" sz="1300" kern="100">
+                          <a:effectLst/>
+                        </a:rPr>
+                        <a:t>0.7577</a:t>
+                      </a:r>
+                      <a:endParaRPr lang="de-DE" sz="1100" kern="100">
+                        <a:effectLst/>
+                      </a:endParaRPr>
+                    </a:p>
+                    <a:p>
+                      <a:pPr algn="just"/>
+                      <a:r>
+                        <a:rPr lang="en-US" sz="1300" kern="100">
+                          <a:effectLst/>
+                        </a:rPr>
+                        <a:t> </a:t>
+                      </a:r>
+                      <a:endParaRPr lang="de-DE" sz="1100" kern="100">
+                        <a:effectLst/>
+                        <a:latin typeface="DengXian" panose="02010600030101010101" pitchFamily="2" charset="-122"/>
+                        <a:ea typeface="DengXian" panose="02010600030101010101" pitchFamily="2" charset="-122"/>
+                        <a:cs typeface="Arial" panose="020B0604020202020204" pitchFamily="34" charset="0"/>
+                      </a:endParaRPr>
+                    </a:p>
+                  </a:txBody>
+                  <a:tcPr marL="72384" marR="72384" marT="0" marB="0"/>
+                </a:tc>
+                <a:tc>
+                  <a:txBody>
+                    <a:bodyPr/>
+                    <a:lstStyle/>
+                    <a:p>
+                      <a:pPr algn="just"/>
+                      <a:r>
+                        <a:rPr lang="en-US" sz="1300" kern="100">
+                          <a:effectLst/>
+                        </a:rPr>
+                        <a:t>0.0382</a:t>
+                      </a:r>
+                      <a:endParaRPr lang="de-DE" sz="1100" kern="100">
+                        <a:effectLst/>
+                        <a:latin typeface="DengXian" panose="02010600030101010101" pitchFamily="2" charset="-122"/>
+                        <a:ea typeface="DengXian" panose="02010600030101010101" pitchFamily="2" charset="-122"/>
+                        <a:cs typeface="Arial" panose="020B0604020202020204" pitchFamily="34" charset="0"/>
+                      </a:endParaRPr>
+                    </a:p>
+                  </a:txBody>
+                  <a:tcPr marL="72384" marR="72384" marT="0" marB="0"/>
+                </a:tc>
+                <a:tc>
+                  <a:txBody>
+                    <a:bodyPr/>
+                    <a:lstStyle/>
+                    <a:p>
+                      <a:pPr algn="just"/>
+                      <a:r>
+                        <a:rPr lang="en-US" sz="1300" kern="100">
+                          <a:effectLst/>
+                        </a:rPr>
+                        <a:t>4.8112</a:t>
+                      </a:r>
+                      <a:endParaRPr lang="de-DE" sz="1100" kern="100">
+                        <a:effectLst/>
+                      </a:endParaRPr>
+                    </a:p>
+                    <a:p>
+                      <a:pPr algn="just"/>
+                      <a:r>
+                        <a:rPr lang="en-US" sz="1300" kern="100">
+                          <a:effectLst/>
+                        </a:rPr>
+                        <a:t> </a:t>
+                      </a:r>
+                      <a:endParaRPr lang="de-DE" sz="1100" kern="100">
+                        <a:effectLst/>
+                        <a:latin typeface="DengXian" panose="02010600030101010101" pitchFamily="2" charset="-122"/>
+                        <a:ea typeface="DengXian" panose="02010600030101010101" pitchFamily="2" charset="-122"/>
+                        <a:cs typeface="Arial" panose="020B0604020202020204" pitchFamily="34" charset="0"/>
+                      </a:endParaRPr>
+                    </a:p>
+                  </a:txBody>
+                  <a:tcPr marL="72384" marR="72384" marT="0" marB="0"/>
+                </a:tc>
+                <a:extLst>
+                  <a:ext uri="{0D108BD9-81ED-4DB2-BD59-A6C34878D82A}">
+                    <a16:rowId xmlns:a16="http://schemas.microsoft.com/office/drawing/2014/main" val="922791641"/>
+                  </a:ext>
+                </a:extLst>
+              </a:tr>
+              <a:tr h="424652">
+                <a:tc>
+                  <a:txBody>
+                    <a:bodyPr/>
+                    <a:lstStyle/>
+                    <a:p>
+                      <a:pPr algn="just"/>
+                      <a:r>
+                        <a:rPr lang="en-US" sz="1300" kern="100">
+                          <a:effectLst/>
+                        </a:rPr>
+                        <a:t>Audio-based(cosine,</a:t>
+                      </a:r>
+                      <a:endParaRPr lang="de-DE" sz="1100" kern="100">
+                        <a:effectLst/>
+                      </a:endParaRPr>
+                    </a:p>
+                    <a:p>
+                      <a:pPr algn="just"/>
+                      <a:r>
+                        <a:rPr lang="en-US" sz="1300" kern="100">
+                          <a:effectLst/>
+                        </a:rPr>
+                        <a:t>Blf-correlation)</a:t>
+                      </a:r>
+                      <a:endParaRPr lang="de-DE" sz="1100" kern="100">
+                        <a:effectLst/>
+                        <a:latin typeface="DengXian" panose="02010600030101010101" pitchFamily="2" charset="-122"/>
+                        <a:ea typeface="DengXian" panose="02010600030101010101" pitchFamily="2" charset="-122"/>
+                        <a:cs typeface="Arial" panose="020B0604020202020204" pitchFamily="34" charset="0"/>
+                      </a:endParaRPr>
+                    </a:p>
+                  </a:txBody>
+                  <a:tcPr marL="72384" marR="72384" marT="0" marB="0"/>
+                </a:tc>
+                <a:tc>
+                  <a:txBody>
+                    <a:bodyPr/>
+                    <a:lstStyle/>
+                    <a:p>
+                      <a:pPr algn="just"/>
+                      <a:r>
+                        <a:rPr lang="en-US" sz="1300" kern="100">
+                          <a:effectLst/>
+                        </a:rPr>
+                        <a:t>0.4098</a:t>
+                      </a:r>
+                      <a:endParaRPr lang="de-DE" sz="1100" kern="100">
+                        <a:effectLst/>
+                        <a:latin typeface="DengXian" panose="02010600030101010101" pitchFamily="2" charset="-122"/>
+                        <a:ea typeface="DengXian" panose="02010600030101010101" pitchFamily="2" charset="-122"/>
+                        <a:cs typeface="Arial" panose="020B0604020202020204" pitchFamily="34" charset="0"/>
+                      </a:endParaRPr>
+                    </a:p>
+                  </a:txBody>
+                  <a:tcPr marL="72384" marR="72384" marT="0" marB="0"/>
+                </a:tc>
+                <a:tc>
+                  <a:txBody>
+                    <a:bodyPr/>
+                    <a:lstStyle/>
+                    <a:p>
+                      <a:pPr algn="just"/>
+                      <a:r>
+                        <a:rPr lang="en-US" sz="1300" kern="100">
+                          <a:effectLst/>
+                        </a:rPr>
+                        <a:t>0.0017</a:t>
+                      </a:r>
+                      <a:endParaRPr lang="de-DE" sz="1100" kern="100">
+                        <a:effectLst/>
+                        <a:latin typeface="DengXian" panose="02010600030101010101" pitchFamily="2" charset="-122"/>
+                        <a:ea typeface="DengXian" panose="02010600030101010101" pitchFamily="2" charset="-122"/>
+                        <a:cs typeface="Arial" panose="020B0604020202020204" pitchFamily="34" charset="0"/>
+                      </a:endParaRPr>
+                    </a:p>
+                  </a:txBody>
+                  <a:tcPr marL="72384" marR="72384" marT="0" marB="0"/>
+                </a:tc>
+                <a:tc>
+                  <a:txBody>
+                    <a:bodyPr/>
+                    <a:lstStyle/>
+                    <a:p>
+                      <a:pPr algn="just"/>
+                      <a:r>
+                        <a:rPr lang="en-US" sz="1300" kern="100">
+                          <a:effectLst/>
+                        </a:rPr>
+                        <a:t>0.6653</a:t>
+                      </a:r>
+                      <a:endParaRPr lang="de-DE" sz="1100" kern="100">
+                        <a:effectLst/>
+                      </a:endParaRPr>
+                    </a:p>
+                    <a:p>
+                      <a:pPr algn="just"/>
+                      <a:r>
+                        <a:rPr lang="en-US" sz="1300" kern="100">
+                          <a:effectLst/>
+                        </a:rPr>
+                        <a:t> </a:t>
+                      </a:r>
+                      <a:endParaRPr lang="de-DE" sz="1100" kern="100">
+                        <a:effectLst/>
+                        <a:latin typeface="DengXian" panose="02010600030101010101" pitchFamily="2" charset="-122"/>
+                        <a:ea typeface="DengXian" panose="02010600030101010101" pitchFamily="2" charset="-122"/>
+                        <a:cs typeface="Arial" panose="020B0604020202020204" pitchFamily="34" charset="0"/>
+                      </a:endParaRPr>
+                    </a:p>
+                  </a:txBody>
+                  <a:tcPr marL="72384" marR="72384" marT="0" marB="0"/>
+                </a:tc>
+                <a:tc>
+                  <a:txBody>
+                    <a:bodyPr/>
+                    <a:lstStyle/>
+                    <a:p>
+                      <a:pPr algn="just"/>
+                      <a:r>
+                        <a:rPr lang="en-US" sz="1300" kern="100">
+                          <a:effectLst/>
+                        </a:rPr>
+                        <a:t>0.0382</a:t>
+                      </a:r>
+                      <a:endParaRPr lang="de-DE" sz="1100" kern="100">
+                        <a:effectLst/>
+                        <a:latin typeface="DengXian" panose="02010600030101010101" pitchFamily="2" charset="-122"/>
+                        <a:ea typeface="DengXian" panose="02010600030101010101" pitchFamily="2" charset="-122"/>
+                        <a:cs typeface="Arial" panose="020B0604020202020204" pitchFamily="34" charset="0"/>
+                      </a:endParaRPr>
+                    </a:p>
+                  </a:txBody>
+                  <a:tcPr marL="72384" marR="72384" marT="0" marB="0"/>
+                </a:tc>
+                <a:tc>
+                  <a:txBody>
+                    <a:bodyPr/>
+                    <a:lstStyle/>
+                    <a:p>
+                      <a:pPr algn="just"/>
+                      <a:r>
+                        <a:rPr lang="en-US" sz="1300" kern="100">
+                          <a:effectLst/>
+                        </a:rPr>
+                        <a:t>4.8942</a:t>
+                      </a:r>
+                      <a:endParaRPr lang="de-DE" sz="1100" kern="100">
+                        <a:effectLst/>
+                      </a:endParaRPr>
+                    </a:p>
+                    <a:p>
+                      <a:pPr algn="just"/>
+                      <a:r>
+                        <a:rPr lang="en-US" sz="1300" kern="100">
+                          <a:effectLst/>
+                        </a:rPr>
+                        <a:t> </a:t>
+                      </a:r>
+                      <a:endParaRPr lang="de-DE" sz="1100" kern="100">
+                        <a:effectLst/>
+                        <a:latin typeface="DengXian" panose="02010600030101010101" pitchFamily="2" charset="-122"/>
+                        <a:ea typeface="DengXian" panose="02010600030101010101" pitchFamily="2" charset="-122"/>
+                        <a:cs typeface="Arial" panose="020B0604020202020204" pitchFamily="34" charset="0"/>
+                      </a:endParaRPr>
+                    </a:p>
+                  </a:txBody>
+                  <a:tcPr marL="72384" marR="72384" marT="0" marB="0"/>
+                </a:tc>
+                <a:extLst>
+                  <a:ext uri="{0D108BD9-81ED-4DB2-BD59-A6C34878D82A}">
+                    <a16:rowId xmlns:a16="http://schemas.microsoft.com/office/drawing/2014/main" val="3642683988"/>
+                  </a:ext>
+                </a:extLst>
+              </a:tr>
+              <a:tr h="424652">
+                <a:tc>
+                  <a:txBody>
+                    <a:bodyPr/>
+                    <a:lstStyle/>
+                    <a:p>
+                      <a:pPr algn="just"/>
+                      <a:r>
+                        <a:rPr lang="en-US" sz="1300" kern="100">
+                          <a:effectLst/>
+                        </a:rPr>
+                        <a:t>Audio-based(cosine, ivec 256)</a:t>
+                      </a:r>
+                      <a:endParaRPr lang="de-DE" sz="1100" kern="100">
+                        <a:effectLst/>
+                        <a:latin typeface="DengXian" panose="02010600030101010101" pitchFamily="2" charset="-122"/>
+                        <a:ea typeface="DengXian" panose="02010600030101010101" pitchFamily="2" charset="-122"/>
+                        <a:cs typeface="Arial" panose="020B0604020202020204" pitchFamily="34" charset="0"/>
+                      </a:endParaRPr>
+                    </a:p>
+                  </a:txBody>
+                  <a:tcPr marL="72384" marR="72384" marT="0" marB="0"/>
+                </a:tc>
+                <a:tc>
+                  <a:txBody>
+                    <a:bodyPr/>
+                    <a:lstStyle/>
+                    <a:p>
+                      <a:pPr algn="just"/>
+                      <a:r>
+                        <a:rPr lang="en-US" sz="1300" kern="100">
+                          <a:effectLst/>
+                        </a:rPr>
+                        <a:t>0.4344</a:t>
+                      </a:r>
+                      <a:endParaRPr lang="de-DE" sz="1100" kern="100">
+                        <a:effectLst/>
+                        <a:latin typeface="DengXian" panose="02010600030101010101" pitchFamily="2" charset="-122"/>
+                        <a:ea typeface="DengXian" panose="02010600030101010101" pitchFamily="2" charset="-122"/>
+                        <a:cs typeface="Arial" panose="020B0604020202020204" pitchFamily="34" charset="0"/>
+                      </a:endParaRPr>
+                    </a:p>
+                  </a:txBody>
+                  <a:tcPr marL="72384" marR="72384" marT="0" marB="0"/>
+                </a:tc>
+                <a:tc>
+                  <a:txBody>
+                    <a:bodyPr/>
+                    <a:lstStyle/>
+                    <a:p>
+                      <a:pPr algn="just"/>
+                      <a:r>
+                        <a:rPr lang="en-US" sz="1300" kern="100">
+                          <a:effectLst/>
+                        </a:rPr>
+                        <a:t>0.0019</a:t>
+                      </a:r>
+                      <a:endParaRPr lang="de-DE" sz="1100" kern="100">
+                        <a:effectLst/>
+                        <a:latin typeface="DengXian" panose="02010600030101010101" pitchFamily="2" charset="-122"/>
+                        <a:ea typeface="DengXian" panose="02010600030101010101" pitchFamily="2" charset="-122"/>
+                        <a:cs typeface="Arial" panose="020B0604020202020204" pitchFamily="34" charset="0"/>
+                      </a:endParaRPr>
+                    </a:p>
+                  </a:txBody>
+                  <a:tcPr marL="72384" marR="72384" marT="0" marB="0"/>
+                </a:tc>
+                <a:tc>
+                  <a:txBody>
+                    <a:bodyPr/>
+                    <a:lstStyle/>
+                    <a:p>
+                      <a:pPr algn="just"/>
+                      <a:r>
+                        <a:rPr lang="en-US" sz="1300" kern="100">
+                          <a:effectLst/>
+                        </a:rPr>
+                        <a:t>0.6587</a:t>
+                      </a:r>
+                      <a:endParaRPr lang="de-DE" sz="1100" kern="100">
+                        <a:effectLst/>
+                      </a:endParaRPr>
+                    </a:p>
+                    <a:p>
+                      <a:pPr algn="just"/>
+                      <a:r>
+                        <a:rPr lang="en-US" sz="1300" kern="100">
+                          <a:effectLst/>
+                        </a:rPr>
+                        <a:t> </a:t>
+                      </a:r>
+                      <a:endParaRPr lang="de-DE" sz="1100" kern="100">
+                        <a:effectLst/>
+                        <a:latin typeface="DengXian" panose="02010600030101010101" pitchFamily="2" charset="-122"/>
+                        <a:ea typeface="DengXian" panose="02010600030101010101" pitchFamily="2" charset="-122"/>
+                        <a:cs typeface="Arial" panose="020B0604020202020204" pitchFamily="34" charset="0"/>
+                      </a:endParaRPr>
+                    </a:p>
+                  </a:txBody>
+                  <a:tcPr marL="72384" marR="72384" marT="0" marB="0"/>
+                </a:tc>
+                <a:tc>
+                  <a:txBody>
+                    <a:bodyPr/>
+                    <a:lstStyle/>
+                    <a:p>
+                      <a:pPr algn="just"/>
+                      <a:r>
+                        <a:rPr lang="en-US" sz="1300" kern="100">
+                          <a:effectLst/>
+                        </a:rPr>
+                        <a:t>0.0382</a:t>
+                      </a:r>
+                      <a:endParaRPr lang="de-DE" sz="1100" kern="100">
+                        <a:effectLst/>
+                        <a:latin typeface="DengXian" panose="02010600030101010101" pitchFamily="2" charset="-122"/>
+                        <a:ea typeface="DengXian" panose="02010600030101010101" pitchFamily="2" charset="-122"/>
+                        <a:cs typeface="Arial" panose="020B0604020202020204" pitchFamily="34" charset="0"/>
+                      </a:endParaRPr>
+                    </a:p>
+                  </a:txBody>
+                  <a:tcPr marL="72384" marR="72384" marT="0" marB="0"/>
+                </a:tc>
+                <a:tc>
+                  <a:txBody>
+                    <a:bodyPr/>
+                    <a:lstStyle/>
+                    <a:p>
+                      <a:pPr algn="just"/>
+                      <a:r>
+                        <a:rPr lang="en-US" sz="1300" kern="100">
+                          <a:effectLst/>
+                        </a:rPr>
+                        <a:t>4.9036</a:t>
+                      </a:r>
+                      <a:endParaRPr lang="de-DE" sz="1100" kern="100">
+                        <a:effectLst/>
+                      </a:endParaRPr>
+                    </a:p>
+                    <a:p>
+                      <a:pPr algn="just"/>
+                      <a:r>
+                        <a:rPr lang="en-US" sz="1300" kern="100">
+                          <a:effectLst/>
+                        </a:rPr>
+                        <a:t> </a:t>
+                      </a:r>
+                      <a:endParaRPr lang="de-DE" sz="1100" kern="100">
+                        <a:effectLst/>
+                        <a:latin typeface="DengXian" panose="02010600030101010101" pitchFamily="2" charset="-122"/>
+                        <a:ea typeface="DengXian" panose="02010600030101010101" pitchFamily="2" charset="-122"/>
+                        <a:cs typeface="Arial" panose="020B0604020202020204" pitchFamily="34" charset="0"/>
+                      </a:endParaRPr>
+                    </a:p>
+                  </a:txBody>
+                  <a:tcPr marL="72384" marR="72384" marT="0" marB="0"/>
+                </a:tc>
+                <a:extLst>
+                  <a:ext uri="{0D108BD9-81ED-4DB2-BD59-A6C34878D82A}">
+                    <a16:rowId xmlns:a16="http://schemas.microsoft.com/office/drawing/2014/main" val="2092890243"/>
+                  </a:ext>
+                </a:extLst>
+              </a:tr>
+              <a:tr h="424652">
+                <a:tc>
+                  <a:txBody>
+                    <a:bodyPr/>
+                    <a:lstStyle/>
+                    <a:p>
+                      <a:pPr algn="just"/>
+                      <a:r>
+                        <a:rPr lang="en-US" sz="1300" kern="100">
+                          <a:effectLst/>
+                        </a:rPr>
+                        <a:t>Audio-based(cosine,</a:t>
+                      </a:r>
+                      <a:endParaRPr lang="de-DE" sz="1100" kern="100">
+                        <a:effectLst/>
+                      </a:endParaRPr>
+                    </a:p>
+                    <a:p>
+                      <a:pPr algn="just"/>
+                      <a:r>
+                        <a:rPr lang="en-US" sz="1300" kern="100">
+                          <a:effectLst/>
+                        </a:rPr>
+                        <a:t>musicnn)</a:t>
+                      </a:r>
+                      <a:endParaRPr lang="de-DE" sz="1100" kern="100">
+                        <a:effectLst/>
+                        <a:latin typeface="DengXian" panose="02010600030101010101" pitchFamily="2" charset="-122"/>
+                        <a:ea typeface="DengXian" panose="02010600030101010101" pitchFamily="2" charset="-122"/>
+                        <a:cs typeface="Arial" panose="020B0604020202020204" pitchFamily="34" charset="0"/>
+                      </a:endParaRPr>
+                    </a:p>
+                  </a:txBody>
+                  <a:tcPr marL="72384" marR="72384" marT="0" marB="0"/>
+                </a:tc>
+                <a:tc>
+                  <a:txBody>
+                    <a:bodyPr/>
+                    <a:lstStyle/>
+                    <a:p>
+                      <a:pPr algn="just"/>
+                      <a:r>
+                        <a:rPr lang="en-US" sz="1300" kern="100">
+                          <a:effectLst/>
+                        </a:rPr>
+                        <a:t>0.4813</a:t>
+                      </a:r>
+                      <a:endParaRPr lang="de-DE" sz="1100" kern="100">
+                        <a:effectLst/>
+                        <a:latin typeface="DengXian" panose="02010600030101010101" pitchFamily="2" charset="-122"/>
+                        <a:ea typeface="DengXian" panose="02010600030101010101" pitchFamily="2" charset="-122"/>
+                        <a:cs typeface="Arial" panose="020B0604020202020204" pitchFamily="34" charset="0"/>
+                      </a:endParaRPr>
+                    </a:p>
+                  </a:txBody>
+                  <a:tcPr marL="72384" marR="72384" marT="0" marB="0"/>
+                </a:tc>
+                <a:tc>
+                  <a:txBody>
+                    <a:bodyPr/>
+                    <a:lstStyle/>
+                    <a:p>
+                      <a:pPr algn="just"/>
+                      <a:r>
+                        <a:rPr lang="en-US" sz="1300" kern="100">
+                          <a:effectLst/>
+                        </a:rPr>
+                        <a:t>0.0022</a:t>
+                      </a:r>
+                      <a:endParaRPr lang="de-DE" sz="1100" kern="100">
+                        <a:effectLst/>
+                        <a:latin typeface="DengXian" panose="02010600030101010101" pitchFamily="2" charset="-122"/>
+                        <a:ea typeface="DengXian" panose="02010600030101010101" pitchFamily="2" charset="-122"/>
+                        <a:cs typeface="Arial" panose="020B0604020202020204" pitchFamily="34" charset="0"/>
+                      </a:endParaRPr>
+                    </a:p>
+                  </a:txBody>
+                  <a:tcPr marL="72384" marR="72384" marT="0" marB="0"/>
+                </a:tc>
+                <a:tc>
+                  <a:txBody>
+                    <a:bodyPr/>
+                    <a:lstStyle/>
+                    <a:p>
+                      <a:pPr algn="just"/>
+                      <a:r>
+                        <a:rPr lang="en-US" sz="1300" kern="100">
+                          <a:effectLst/>
+                        </a:rPr>
+                        <a:t>0.7137</a:t>
+                      </a:r>
+                      <a:endParaRPr lang="de-DE" sz="1100" kern="100">
+                        <a:effectLst/>
+                      </a:endParaRPr>
+                    </a:p>
+                    <a:p>
+                      <a:pPr algn="just"/>
+                      <a:r>
+                        <a:rPr lang="en-US" sz="1300" kern="100">
+                          <a:effectLst/>
+                        </a:rPr>
+                        <a:t> </a:t>
+                      </a:r>
+                      <a:endParaRPr lang="de-DE" sz="1100" kern="100">
+                        <a:effectLst/>
+                        <a:latin typeface="DengXian" panose="02010600030101010101" pitchFamily="2" charset="-122"/>
+                        <a:ea typeface="DengXian" panose="02010600030101010101" pitchFamily="2" charset="-122"/>
+                        <a:cs typeface="Arial" panose="020B0604020202020204" pitchFamily="34" charset="0"/>
+                      </a:endParaRPr>
+                    </a:p>
+                  </a:txBody>
+                  <a:tcPr marL="72384" marR="72384" marT="0" marB="0"/>
+                </a:tc>
+                <a:tc>
+                  <a:txBody>
+                    <a:bodyPr/>
+                    <a:lstStyle/>
+                    <a:p>
+                      <a:pPr algn="just"/>
+                      <a:r>
+                        <a:rPr lang="en-US" sz="1300" kern="100">
+                          <a:effectLst/>
+                        </a:rPr>
+                        <a:t>0.0383</a:t>
+                      </a:r>
+                      <a:endParaRPr lang="de-DE" sz="1100" kern="100">
+                        <a:effectLst/>
+                        <a:latin typeface="DengXian" panose="02010600030101010101" pitchFamily="2" charset="-122"/>
+                        <a:ea typeface="DengXian" panose="02010600030101010101" pitchFamily="2" charset="-122"/>
+                        <a:cs typeface="Arial" panose="020B0604020202020204" pitchFamily="34" charset="0"/>
+                      </a:endParaRPr>
+                    </a:p>
+                  </a:txBody>
+                  <a:tcPr marL="72384" marR="72384" marT="0" marB="0"/>
+                </a:tc>
+                <a:tc>
+                  <a:txBody>
+                    <a:bodyPr/>
+                    <a:lstStyle/>
+                    <a:p>
+                      <a:pPr algn="just"/>
+                      <a:r>
+                        <a:rPr lang="en-US" sz="1300" kern="100">
+                          <a:effectLst/>
+                        </a:rPr>
+                        <a:t>4.7048</a:t>
+                      </a:r>
+                      <a:endParaRPr lang="de-DE" sz="1100" kern="100">
+                        <a:effectLst/>
+                      </a:endParaRPr>
+                    </a:p>
+                    <a:p>
+                      <a:pPr algn="just"/>
+                      <a:r>
+                        <a:rPr lang="en-US" sz="1300" kern="100">
+                          <a:effectLst/>
+                        </a:rPr>
+                        <a:t> </a:t>
+                      </a:r>
+                      <a:endParaRPr lang="de-DE" sz="1100" kern="100">
+                        <a:effectLst/>
+                        <a:latin typeface="DengXian" panose="02010600030101010101" pitchFamily="2" charset="-122"/>
+                        <a:ea typeface="DengXian" panose="02010600030101010101" pitchFamily="2" charset="-122"/>
+                        <a:cs typeface="Arial" panose="020B0604020202020204" pitchFamily="34" charset="0"/>
+                      </a:endParaRPr>
+                    </a:p>
+                  </a:txBody>
+                  <a:tcPr marL="72384" marR="72384" marT="0" marB="0"/>
+                </a:tc>
+                <a:extLst>
+                  <a:ext uri="{0D108BD9-81ED-4DB2-BD59-A6C34878D82A}">
+                    <a16:rowId xmlns:a16="http://schemas.microsoft.com/office/drawing/2014/main" val="2533845923"/>
+                  </a:ext>
+                </a:extLst>
+              </a:tr>
+              <a:tr h="424652">
+                <a:tc>
+                  <a:txBody>
+                    <a:bodyPr/>
+                    <a:lstStyle/>
+                    <a:p>
+                      <a:pPr algn="just"/>
+                      <a:r>
+                        <a:rPr lang="en-US" sz="1300" kern="100">
+                          <a:effectLst/>
+                        </a:rPr>
+                        <a:t>Text-based(cosine, tf-idf)</a:t>
+                      </a:r>
+                      <a:endParaRPr lang="de-DE" sz="1100" kern="100">
+                        <a:effectLst/>
+                        <a:latin typeface="DengXian" panose="02010600030101010101" pitchFamily="2" charset="-122"/>
+                        <a:ea typeface="DengXian" panose="02010600030101010101" pitchFamily="2" charset="-122"/>
+                        <a:cs typeface="Arial" panose="020B0604020202020204" pitchFamily="34" charset="0"/>
+                      </a:endParaRPr>
+                    </a:p>
+                  </a:txBody>
+                  <a:tcPr marL="72384" marR="72384" marT="0" marB="0"/>
+                </a:tc>
+                <a:tc>
+                  <a:txBody>
+                    <a:bodyPr/>
+                    <a:lstStyle/>
+                    <a:p>
+                      <a:pPr algn="just"/>
+                      <a:r>
+                        <a:rPr lang="en-US" sz="1300" kern="100">
+                          <a:effectLst/>
+                        </a:rPr>
+                        <a:t>0.3794</a:t>
+                      </a:r>
+                      <a:endParaRPr lang="de-DE" sz="1100" kern="100">
+                        <a:effectLst/>
+                        <a:latin typeface="DengXian" panose="02010600030101010101" pitchFamily="2" charset="-122"/>
+                        <a:ea typeface="DengXian" panose="02010600030101010101" pitchFamily="2" charset="-122"/>
+                        <a:cs typeface="Arial" panose="020B0604020202020204" pitchFamily="34" charset="0"/>
+                      </a:endParaRPr>
+                    </a:p>
+                  </a:txBody>
+                  <a:tcPr marL="72384" marR="72384" marT="0" marB="0"/>
+                </a:tc>
+                <a:tc>
+                  <a:txBody>
+                    <a:bodyPr/>
+                    <a:lstStyle/>
+                    <a:p>
+                      <a:pPr algn="just"/>
+                      <a:r>
+                        <a:rPr lang="en-US" sz="1300" kern="100">
+                          <a:effectLst/>
+                        </a:rPr>
+                        <a:t>0.0014</a:t>
+                      </a:r>
+                      <a:endParaRPr lang="de-DE" sz="1100" kern="100">
+                        <a:effectLst/>
+                        <a:latin typeface="DengXian" panose="02010600030101010101" pitchFamily="2" charset="-122"/>
+                        <a:ea typeface="DengXian" panose="02010600030101010101" pitchFamily="2" charset="-122"/>
+                        <a:cs typeface="Arial" panose="020B0604020202020204" pitchFamily="34" charset="0"/>
+                      </a:endParaRPr>
+                    </a:p>
+                  </a:txBody>
+                  <a:tcPr marL="72384" marR="72384" marT="0" marB="0"/>
+                </a:tc>
+                <a:tc>
+                  <a:txBody>
+                    <a:bodyPr/>
+                    <a:lstStyle/>
+                    <a:p>
+                      <a:pPr algn="just"/>
+                      <a:r>
+                        <a:rPr lang="en-US" sz="1300" kern="100">
+                          <a:effectLst/>
+                        </a:rPr>
+                        <a:t>0.6820</a:t>
+                      </a:r>
+                      <a:endParaRPr lang="de-DE" sz="1100" kern="100">
+                        <a:effectLst/>
+                      </a:endParaRPr>
+                    </a:p>
+                    <a:p>
+                      <a:pPr algn="just"/>
+                      <a:r>
+                        <a:rPr lang="en-US" sz="1300" kern="100">
+                          <a:effectLst/>
+                        </a:rPr>
+                        <a:t> </a:t>
+                      </a:r>
+                      <a:endParaRPr lang="de-DE" sz="1100" kern="100">
+                        <a:effectLst/>
+                        <a:latin typeface="DengXian" panose="02010600030101010101" pitchFamily="2" charset="-122"/>
+                        <a:ea typeface="DengXian" panose="02010600030101010101" pitchFamily="2" charset="-122"/>
+                        <a:cs typeface="Arial" panose="020B0604020202020204" pitchFamily="34" charset="0"/>
+                      </a:endParaRPr>
+                    </a:p>
+                  </a:txBody>
+                  <a:tcPr marL="72384" marR="72384" marT="0" marB="0"/>
+                </a:tc>
+                <a:tc>
+                  <a:txBody>
+                    <a:bodyPr/>
+                    <a:lstStyle/>
+                    <a:p>
+                      <a:pPr algn="just"/>
+                      <a:r>
+                        <a:rPr lang="en-US" sz="1300" kern="100">
+                          <a:effectLst/>
+                        </a:rPr>
+                        <a:t>0.0377</a:t>
+                      </a:r>
+                      <a:endParaRPr lang="de-DE" sz="1100" kern="100">
+                        <a:effectLst/>
+                        <a:latin typeface="DengXian" panose="02010600030101010101" pitchFamily="2" charset="-122"/>
+                        <a:ea typeface="DengXian" panose="02010600030101010101" pitchFamily="2" charset="-122"/>
+                        <a:cs typeface="Arial" panose="020B0604020202020204" pitchFamily="34" charset="0"/>
+                      </a:endParaRPr>
+                    </a:p>
+                  </a:txBody>
+                  <a:tcPr marL="72384" marR="72384" marT="0" marB="0"/>
+                </a:tc>
+                <a:tc>
+                  <a:txBody>
+                    <a:bodyPr/>
+                    <a:lstStyle/>
+                    <a:p>
+                      <a:pPr algn="just"/>
+                      <a:r>
+                        <a:rPr lang="en-US" sz="1300" kern="100">
+                          <a:effectLst/>
+                        </a:rPr>
+                        <a:t>4.9743</a:t>
+                      </a:r>
+                      <a:endParaRPr lang="de-DE" sz="1100" kern="100">
+                        <a:effectLst/>
+                      </a:endParaRPr>
+                    </a:p>
+                    <a:p>
+                      <a:pPr algn="just"/>
+                      <a:r>
+                        <a:rPr lang="en-US" sz="1300" kern="100">
+                          <a:effectLst/>
+                        </a:rPr>
+                        <a:t> </a:t>
+                      </a:r>
+                      <a:endParaRPr lang="de-DE" sz="1100" kern="100">
+                        <a:effectLst/>
+                        <a:latin typeface="DengXian" panose="02010600030101010101" pitchFamily="2" charset="-122"/>
+                        <a:ea typeface="DengXian" panose="02010600030101010101" pitchFamily="2" charset="-122"/>
+                        <a:cs typeface="Arial" panose="020B0604020202020204" pitchFamily="34" charset="0"/>
+                      </a:endParaRPr>
+                    </a:p>
+                  </a:txBody>
+                  <a:tcPr marL="72384" marR="72384" marT="0" marB="0"/>
+                </a:tc>
+                <a:extLst>
+                  <a:ext uri="{0D108BD9-81ED-4DB2-BD59-A6C34878D82A}">
+                    <a16:rowId xmlns:a16="http://schemas.microsoft.com/office/drawing/2014/main" val="141560578"/>
+                  </a:ext>
+                </a:extLst>
+              </a:tr>
+              <a:tr h="424652">
+                <a:tc>
+                  <a:txBody>
+                    <a:bodyPr/>
+                    <a:lstStyle/>
+                    <a:p>
+                      <a:pPr algn="just"/>
+                      <a:r>
+                        <a:rPr lang="en-US" sz="1300" kern="100">
+                          <a:effectLst/>
+                        </a:rPr>
+                        <a:t>Text-based(cosine,</a:t>
+                      </a:r>
+                      <a:endParaRPr lang="de-DE" sz="1100" kern="100">
+                        <a:effectLst/>
+                      </a:endParaRPr>
+                    </a:p>
+                    <a:p>
+                      <a:pPr algn="just"/>
+                      <a:r>
+                        <a:rPr lang="en-US" sz="1300" kern="100">
+                          <a:effectLst/>
+                        </a:rPr>
+                        <a:t>word2vec)</a:t>
+                      </a:r>
+                      <a:endParaRPr lang="de-DE" sz="1100" kern="100">
+                        <a:effectLst/>
+                        <a:latin typeface="DengXian" panose="02010600030101010101" pitchFamily="2" charset="-122"/>
+                        <a:ea typeface="DengXian" panose="02010600030101010101" pitchFamily="2" charset="-122"/>
+                        <a:cs typeface="Arial" panose="020B0604020202020204" pitchFamily="34" charset="0"/>
+                      </a:endParaRPr>
+                    </a:p>
+                  </a:txBody>
+                  <a:tcPr marL="72384" marR="72384" marT="0" marB="0"/>
+                </a:tc>
+                <a:tc>
+                  <a:txBody>
+                    <a:bodyPr/>
+                    <a:lstStyle/>
+                    <a:p>
+                      <a:pPr algn="just"/>
+                      <a:r>
+                        <a:rPr lang="en-US" sz="1300" kern="100">
+                          <a:effectLst/>
+                        </a:rPr>
+                        <a:t>0.3851</a:t>
+                      </a:r>
+                      <a:endParaRPr lang="de-DE" sz="1100" kern="100">
+                        <a:effectLst/>
+                        <a:latin typeface="DengXian" panose="02010600030101010101" pitchFamily="2" charset="-122"/>
+                        <a:ea typeface="DengXian" panose="02010600030101010101" pitchFamily="2" charset="-122"/>
+                        <a:cs typeface="Arial" panose="020B0604020202020204" pitchFamily="34" charset="0"/>
+                      </a:endParaRPr>
+                    </a:p>
+                  </a:txBody>
+                  <a:tcPr marL="72384" marR="72384" marT="0" marB="0"/>
+                </a:tc>
+                <a:tc>
+                  <a:txBody>
+                    <a:bodyPr/>
+                    <a:lstStyle/>
+                    <a:p>
+                      <a:pPr algn="just"/>
+                      <a:r>
+                        <a:rPr lang="en-US" sz="1300" kern="100">
+                          <a:effectLst/>
+                        </a:rPr>
+                        <a:t>0.0017</a:t>
+                      </a:r>
+                      <a:endParaRPr lang="de-DE" sz="1100" kern="100">
+                        <a:effectLst/>
+                        <a:latin typeface="DengXian" panose="02010600030101010101" pitchFamily="2" charset="-122"/>
+                        <a:ea typeface="DengXian" panose="02010600030101010101" pitchFamily="2" charset="-122"/>
+                        <a:cs typeface="Arial" panose="020B0604020202020204" pitchFamily="34" charset="0"/>
+                      </a:endParaRPr>
+                    </a:p>
+                  </a:txBody>
+                  <a:tcPr marL="72384" marR="72384" marT="0" marB="0"/>
+                </a:tc>
+                <a:tc>
+                  <a:txBody>
+                    <a:bodyPr/>
+                    <a:lstStyle/>
+                    <a:p>
+                      <a:pPr algn="just"/>
+                      <a:r>
+                        <a:rPr lang="en-US" sz="1300" kern="100">
+                          <a:effectLst/>
+                        </a:rPr>
+                        <a:t>0.6639</a:t>
+                      </a:r>
+                      <a:endParaRPr lang="de-DE" sz="1100" kern="100">
+                        <a:effectLst/>
+                      </a:endParaRPr>
+                    </a:p>
+                    <a:p>
+                      <a:pPr algn="just"/>
+                      <a:r>
+                        <a:rPr lang="en-US" sz="1300" kern="100">
+                          <a:effectLst/>
+                        </a:rPr>
+                        <a:t> </a:t>
+                      </a:r>
+                      <a:endParaRPr lang="de-DE" sz="1100" kern="100">
+                        <a:effectLst/>
+                        <a:latin typeface="DengXian" panose="02010600030101010101" pitchFamily="2" charset="-122"/>
+                        <a:ea typeface="DengXian" panose="02010600030101010101" pitchFamily="2" charset="-122"/>
+                        <a:cs typeface="Arial" panose="020B0604020202020204" pitchFamily="34" charset="0"/>
+                      </a:endParaRPr>
+                    </a:p>
+                  </a:txBody>
+                  <a:tcPr marL="72384" marR="72384" marT="0" marB="0"/>
+                </a:tc>
+                <a:tc>
+                  <a:txBody>
+                    <a:bodyPr/>
+                    <a:lstStyle/>
+                    <a:p>
+                      <a:pPr algn="just"/>
+                      <a:r>
+                        <a:rPr lang="en-US" sz="1300" kern="100">
+                          <a:effectLst/>
+                        </a:rPr>
+                        <a:t>0.0378</a:t>
+                      </a:r>
+                      <a:endParaRPr lang="de-DE" sz="1100" kern="100">
+                        <a:effectLst/>
+                        <a:latin typeface="DengXian" panose="02010600030101010101" pitchFamily="2" charset="-122"/>
+                        <a:ea typeface="DengXian" panose="02010600030101010101" pitchFamily="2" charset="-122"/>
+                        <a:cs typeface="Arial" panose="020B0604020202020204" pitchFamily="34" charset="0"/>
+                      </a:endParaRPr>
+                    </a:p>
+                  </a:txBody>
+                  <a:tcPr marL="72384" marR="72384" marT="0" marB="0"/>
+                </a:tc>
+                <a:tc>
+                  <a:txBody>
+                    <a:bodyPr/>
+                    <a:lstStyle/>
+                    <a:p>
+                      <a:pPr algn="just"/>
+                      <a:r>
+                        <a:rPr lang="en-US" sz="1300" kern="100">
+                          <a:effectLst/>
+                        </a:rPr>
+                        <a:t>4.8492</a:t>
+                      </a:r>
+                      <a:endParaRPr lang="de-DE" sz="1100" kern="100">
+                        <a:effectLst/>
+                      </a:endParaRPr>
+                    </a:p>
+                    <a:p>
+                      <a:pPr algn="just"/>
+                      <a:r>
+                        <a:rPr lang="en-US" sz="1300" kern="100">
+                          <a:effectLst/>
+                        </a:rPr>
+                        <a:t> </a:t>
+                      </a:r>
+                      <a:endParaRPr lang="de-DE" sz="1100" kern="100">
+                        <a:effectLst/>
+                        <a:latin typeface="DengXian" panose="02010600030101010101" pitchFamily="2" charset="-122"/>
+                        <a:ea typeface="DengXian" panose="02010600030101010101" pitchFamily="2" charset="-122"/>
+                        <a:cs typeface="Arial" panose="020B0604020202020204" pitchFamily="34" charset="0"/>
+                      </a:endParaRPr>
+                    </a:p>
+                  </a:txBody>
+                  <a:tcPr marL="72384" marR="72384" marT="0" marB="0"/>
+                </a:tc>
+                <a:extLst>
+                  <a:ext uri="{0D108BD9-81ED-4DB2-BD59-A6C34878D82A}">
+                    <a16:rowId xmlns:a16="http://schemas.microsoft.com/office/drawing/2014/main" val="2344375003"/>
+                  </a:ext>
+                </a:extLst>
+              </a:tr>
+              <a:tr h="424652">
+                <a:tc>
+                  <a:txBody>
+                    <a:bodyPr/>
+                    <a:lstStyle/>
+                    <a:p>
+                      <a:pPr algn="just"/>
+                      <a:r>
+                        <a:rPr lang="en-US" sz="1300" kern="100">
+                          <a:effectLst/>
+                        </a:rPr>
+                        <a:t>Text-based(cosine,</a:t>
+                      </a:r>
+                      <a:endParaRPr lang="de-DE" sz="1100" kern="100">
+                        <a:effectLst/>
+                      </a:endParaRPr>
+                    </a:p>
+                    <a:p>
+                      <a:pPr algn="just"/>
+                      <a:r>
+                        <a:rPr lang="en-US" sz="1300" kern="100">
+                          <a:effectLst/>
+                        </a:rPr>
+                        <a:t>Bert)</a:t>
+                      </a:r>
+                      <a:endParaRPr lang="de-DE" sz="1100" kern="100">
+                        <a:effectLst/>
+                        <a:latin typeface="DengXian" panose="02010600030101010101" pitchFamily="2" charset="-122"/>
+                        <a:ea typeface="DengXian" panose="02010600030101010101" pitchFamily="2" charset="-122"/>
+                        <a:cs typeface="Arial" panose="020B0604020202020204" pitchFamily="34" charset="0"/>
+                      </a:endParaRPr>
+                    </a:p>
+                  </a:txBody>
+                  <a:tcPr marL="72384" marR="72384" marT="0" marB="0"/>
+                </a:tc>
+                <a:tc>
+                  <a:txBody>
+                    <a:bodyPr/>
+                    <a:lstStyle/>
+                    <a:p>
+                      <a:pPr algn="just"/>
+                      <a:r>
+                        <a:rPr lang="en-US" sz="1300" kern="100">
+                          <a:effectLst/>
+                        </a:rPr>
+                        <a:t>0.4192</a:t>
+                      </a:r>
+                      <a:endParaRPr lang="de-DE" sz="1100" kern="100">
+                        <a:effectLst/>
+                        <a:latin typeface="DengXian" panose="02010600030101010101" pitchFamily="2" charset="-122"/>
+                        <a:ea typeface="DengXian" panose="02010600030101010101" pitchFamily="2" charset="-122"/>
+                        <a:cs typeface="Arial" panose="020B0604020202020204" pitchFamily="34" charset="0"/>
+                      </a:endParaRPr>
+                    </a:p>
+                  </a:txBody>
+                  <a:tcPr marL="72384" marR="72384" marT="0" marB="0"/>
+                </a:tc>
+                <a:tc>
+                  <a:txBody>
+                    <a:bodyPr/>
+                    <a:lstStyle/>
+                    <a:p>
+                      <a:pPr algn="just"/>
+                      <a:r>
+                        <a:rPr lang="en-US" sz="1300" kern="100">
+                          <a:effectLst/>
+                        </a:rPr>
+                        <a:t>0.0020</a:t>
+                      </a:r>
+                      <a:endParaRPr lang="de-DE" sz="1100" kern="100">
+                        <a:effectLst/>
+                        <a:latin typeface="DengXian" panose="02010600030101010101" pitchFamily="2" charset="-122"/>
+                        <a:ea typeface="DengXian" panose="02010600030101010101" pitchFamily="2" charset="-122"/>
+                        <a:cs typeface="Arial" panose="020B0604020202020204" pitchFamily="34" charset="0"/>
+                      </a:endParaRPr>
+                    </a:p>
+                  </a:txBody>
+                  <a:tcPr marL="72384" marR="72384" marT="0" marB="0"/>
+                </a:tc>
+                <a:tc>
+                  <a:txBody>
+                    <a:bodyPr/>
+                    <a:lstStyle/>
+                    <a:p>
+                      <a:pPr algn="just"/>
+                      <a:r>
+                        <a:rPr lang="en-US" sz="1300" kern="100">
+                          <a:effectLst/>
+                        </a:rPr>
+                        <a:t>0.6820</a:t>
+                      </a:r>
+                      <a:r>
+                        <a:rPr lang="en-US" sz="1100" kern="100">
+                          <a:effectLst/>
+                        </a:rPr>
+                        <a:t> </a:t>
+                      </a:r>
+                      <a:r>
+                        <a:rPr lang="de-DE" sz="1100" kern="100">
+                          <a:effectLst/>
+                        </a:rPr>
+                        <a:t> </a:t>
+                      </a:r>
+                      <a:r>
+                        <a:rPr lang="en-US" sz="1300" kern="100">
+                          <a:effectLst/>
+                        </a:rPr>
+                        <a:t> </a:t>
+                      </a:r>
+                      <a:endParaRPr lang="de-DE" sz="1100" kern="100">
+                        <a:effectLst/>
+                        <a:latin typeface="DengXian" panose="02010600030101010101" pitchFamily="2" charset="-122"/>
+                        <a:ea typeface="DengXian" panose="02010600030101010101" pitchFamily="2" charset="-122"/>
+                        <a:cs typeface="Arial" panose="020B0604020202020204" pitchFamily="34" charset="0"/>
+                      </a:endParaRPr>
+                    </a:p>
+                  </a:txBody>
+                  <a:tcPr marL="72384" marR="72384" marT="0" marB="0"/>
+                </a:tc>
+                <a:tc>
+                  <a:txBody>
+                    <a:bodyPr/>
+                    <a:lstStyle/>
+                    <a:p>
+                      <a:pPr algn="just"/>
+                      <a:r>
+                        <a:rPr lang="en-US" sz="1300" kern="100">
+                          <a:effectLst/>
+                        </a:rPr>
+                        <a:t>0.0343</a:t>
+                      </a:r>
+                      <a:endParaRPr lang="de-DE" sz="1100" kern="100">
+                        <a:effectLst/>
+                        <a:latin typeface="DengXian" panose="02010600030101010101" pitchFamily="2" charset="-122"/>
+                        <a:ea typeface="DengXian" panose="02010600030101010101" pitchFamily="2" charset="-122"/>
+                        <a:cs typeface="Arial" panose="020B0604020202020204" pitchFamily="34" charset="0"/>
+                      </a:endParaRPr>
+                    </a:p>
+                  </a:txBody>
+                  <a:tcPr marL="72384" marR="72384" marT="0" marB="0"/>
+                </a:tc>
+                <a:tc>
+                  <a:txBody>
+                    <a:bodyPr/>
+                    <a:lstStyle/>
+                    <a:p>
+                      <a:pPr algn="just"/>
+                      <a:r>
+                        <a:rPr lang="en-US" sz="1300" kern="100">
+                          <a:effectLst/>
+                        </a:rPr>
+                        <a:t>4.8448</a:t>
+                      </a:r>
+                      <a:endParaRPr lang="de-DE" sz="1100" kern="100">
+                        <a:effectLst/>
+                      </a:endParaRPr>
+                    </a:p>
+                    <a:p>
+                      <a:pPr algn="just"/>
+                      <a:r>
+                        <a:rPr lang="en-US" sz="1300" kern="100">
+                          <a:effectLst/>
+                        </a:rPr>
+                        <a:t> </a:t>
+                      </a:r>
+                      <a:endParaRPr lang="de-DE" sz="1100" kern="100">
+                        <a:effectLst/>
+                        <a:latin typeface="DengXian" panose="02010600030101010101" pitchFamily="2" charset="-122"/>
+                        <a:ea typeface="DengXian" panose="02010600030101010101" pitchFamily="2" charset="-122"/>
+                        <a:cs typeface="Arial" panose="020B0604020202020204" pitchFamily="34" charset="0"/>
+                      </a:endParaRPr>
+                    </a:p>
+                  </a:txBody>
+                  <a:tcPr marL="72384" marR="72384" marT="0" marB="0"/>
+                </a:tc>
+                <a:extLst>
+                  <a:ext uri="{0D108BD9-81ED-4DB2-BD59-A6C34878D82A}">
+                    <a16:rowId xmlns:a16="http://schemas.microsoft.com/office/drawing/2014/main" val="1592222469"/>
+                  </a:ext>
+                </a:extLst>
+              </a:tr>
+              <a:tr h="231629">
+                <a:tc>
+                  <a:txBody>
+                    <a:bodyPr/>
+                    <a:lstStyle/>
+                    <a:p>
+                      <a:pPr algn="just"/>
+                      <a:r>
+                        <a:rPr lang="en-US" sz="1300" kern="100">
+                          <a:effectLst/>
+                        </a:rPr>
+                        <a:t>Random-Baseline</a:t>
+                      </a:r>
+                      <a:endParaRPr lang="de-DE" sz="1100" kern="100">
+                        <a:effectLst/>
+                        <a:latin typeface="DengXian" panose="02010600030101010101" pitchFamily="2" charset="-122"/>
+                        <a:ea typeface="DengXian" panose="02010600030101010101" pitchFamily="2" charset="-122"/>
+                        <a:cs typeface="Arial" panose="020B0604020202020204" pitchFamily="34" charset="0"/>
+                      </a:endParaRPr>
+                    </a:p>
+                  </a:txBody>
+                  <a:tcPr marL="72384" marR="72384" marT="0" marB="0"/>
+                </a:tc>
+                <a:tc>
+                  <a:txBody>
+                    <a:bodyPr/>
+                    <a:lstStyle/>
+                    <a:p>
+                      <a:pPr algn="just"/>
+                      <a:r>
+                        <a:rPr lang="en-US" sz="1300" kern="100">
+                          <a:effectLst/>
+                        </a:rPr>
+                        <a:t>0.3274</a:t>
+                      </a:r>
+                      <a:endParaRPr lang="de-DE" sz="1100" kern="100">
+                        <a:effectLst/>
+                        <a:latin typeface="DengXian" panose="02010600030101010101" pitchFamily="2" charset="-122"/>
+                        <a:ea typeface="DengXian" panose="02010600030101010101" pitchFamily="2" charset="-122"/>
+                        <a:cs typeface="Arial" panose="020B0604020202020204" pitchFamily="34" charset="0"/>
+                      </a:endParaRPr>
+                    </a:p>
+                  </a:txBody>
+                  <a:tcPr marL="72384" marR="72384" marT="0" marB="0"/>
+                </a:tc>
+                <a:tc>
+                  <a:txBody>
+                    <a:bodyPr/>
+                    <a:lstStyle/>
+                    <a:p>
+                      <a:pPr algn="just"/>
+                      <a:r>
+                        <a:rPr lang="en-US" sz="1300" kern="100">
+                          <a:effectLst/>
+                        </a:rPr>
+                        <a:t>0.0010</a:t>
+                      </a:r>
+                      <a:endParaRPr lang="de-DE" sz="1100" kern="100">
+                        <a:effectLst/>
+                        <a:latin typeface="DengXian" panose="02010600030101010101" pitchFamily="2" charset="-122"/>
+                        <a:ea typeface="DengXian" panose="02010600030101010101" pitchFamily="2" charset="-122"/>
+                        <a:cs typeface="Arial" panose="020B0604020202020204" pitchFamily="34" charset="0"/>
+                      </a:endParaRPr>
+                    </a:p>
+                  </a:txBody>
+                  <a:tcPr marL="72384" marR="72384" marT="0" marB="0"/>
+                </a:tc>
+                <a:tc>
+                  <a:txBody>
+                    <a:bodyPr/>
+                    <a:lstStyle/>
+                    <a:p>
+                      <a:pPr algn="just"/>
+                      <a:r>
+                        <a:rPr lang="en-US" sz="1300" kern="100">
+                          <a:effectLst/>
+                        </a:rPr>
+                        <a:t> </a:t>
+                      </a:r>
+                      <a:endParaRPr lang="de-DE" sz="1100" kern="100">
+                        <a:effectLst/>
+                        <a:latin typeface="DengXian" panose="02010600030101010101" pitchFamily="2" charset="-122"/>
+                        <a:ea typeface="DengXian" panose="02010600030101010101" pitchFamily="2" charset="-122"/>
+                        <a:cs typeface="Arial" panose="020B0604020202020204" pitchFamily="34" charset="0"/>
+                      </a:endParaRPr>
+                    </a:p>
+                  </a:txBody>
+                  <a:tcPr marL="72384" marR="72384" marT="0" marB="0"/>
+                </a:tc>
+                <a:tc>
+                  <a:txBody>
+                    <a:bodyPr/>
+                    <a:lstStyle/>
+                    <a:p>
+                      <a:pPr algn="just"/>
+                      <a:r>
+                        <a:rPr lang="en-US" sz="1300" kern="100">
+                          <a:effectLst/>
+                        </a:rPr>
+                        <a:t>0.0373</a:t>
+                      </a:r>
+                      <a:endParaRPr lang="de-DE" sz="1100" kern="100">
+                        <a:effectLst/>
+                        <a:latin typeface="DengXian" panose="02010600030101010101" pitchFamily="2" charset="-122"/>
+                        <a:ea typeface="DengXian" panose="02010600030101010101" pitchFamily="2" charset="-122"/>
+                        <a:cs typeface="Arial" panose="020B0604020202020204" pitchFamily="34" charset="0"/>
+                      </a:endParaRPr>
+                    </a:p>
+                  </a:txBody>
+                  <a:tcPr marL="72384" marR="72384" marT="0" marB="0"/>
+                </a:tc>
+                <a:tc>
+                  <a:txBody>
+                    <a:bodyPr/>
+                    <a:lstStyle/>
+                    <a:p>
+                      <a:pPr algn="just"/>
+                      <a:r>
+                        <a:rPr lang="en-US" sz="1300" kern="100">
+                          <a:effectLst/>
+                        </a:rPr>
+                        <a:t> </a:t>
+                      </a:r>
+                      <a:endParaRPr lang="de-DE" sz="1100" kern="100">
+                        <a:effectLst/>
+                        <a:latin typeface="DengXian" panose="02010600030101010101" pitchFamily="2" charset="-122"/>
+                        <a:ea typeface="DengXian" panose="02010600030101010101" pitchFamily="2" charset="-122"/>
+                        <a:cs typeface="Arial" panose="020B0604020202020204" pitchFamily="34" charset="0"/>
+                      </a:endParaRPr>
+                    </a:p>
+                  </a:txBody>
+                  <a:tcPr marL="72384" marR="72384" marT="0" marB="0"/>
+                </a:tc>
+                <a:extLst>
+                  <a:ext uri="{0D108BD9-81ED-4DB2-BD59-A6C34878D82A}">
+                    <a16:rowId xmlns:a16="http://schemas.microsoft.com/office/drawing/2014/main" val="2511065317"/>
+                  </a:ext>
+                </a:extLst>
+              </a:tr>
+              <a:tr h="424652">
+                <a:tc>
+                  <a:txBody>
+                    <a:bodyPr/>
+                    <a:lstStyle/>
+                    <a:p>
+                      <a:pPr algn="just"/>
+                      <a:r>
+                        <a:rPr lang="en-US" sz="1300" kern="100">
+                          <a:effectLst/>
+                        </a:rPr>
+                        <a:t>Video-Based(cosine,vgg19)</a:t>
+                      </a:r>
+                      <a:endParaRPr lang="de-DE" sz="1100" kern="100">
+                        <a:effectLst/>
+                        <a:latin typeface="DengXian" panose="02010600030101010101" pitchFamily="2" charset="-122"/>
+                        <a:ea typeface="DengXian" panose="02010600030101010101" pitchFamily="2" charset="-122"/>
+                        <a:cs typeface="Arial" panose="020B0604020202020204" pitchFamily="34" charset="0"/>
+                      </a:endParaRPr>
+                    </a:p>
+                  </a:txBody>
+                  <a:tcPr marL="72384" marR="72384" marT="0" marB="0"/>
+                </a:tc>
+                <a:tc>
+                  <a:txBody>
+                    <a:bodyPr/>
+                    <a:lstStyle/>
+                    <a:p>
+                      <a:pPr algn="just"/>
+                      <a:r>
+                        <a:rPr lang="en-US" sz="1300" kern="100">
+                          <a:effectLst/>
+                        </a:rPr>
+                        <a:t>0.3278</a:t>
+                      </a:r>
+                      <a:endParaRPr lang="de-DE" sz="1100" kern="100">
+                        <a:effectLst/>
+                        <a:latin typeface="DengXian" panose="02010600030101010101" pitchFamily="2" charset="-122"/>
+                        <a:ea typeface="DengXian" panose="02010600030101010101" pitchFamily="2" charset="-122"/>
+                        <a:cs typeface="Arial" panose="020B0604020202020204" pitchFamily="34" charset="0"/>
+                      </a:endParaRPr>
+                    </a:p>
+                  </a:txBody>
+                  <a:tcPr marL="72384" marR="72384" marT="0" marB="0"/>
+                </a:tc>
+                <a:tc>
+                  <a:txBody>
+                    <a:bodyPr/>
+                    <a:lstStyle/>
+                    <a:p>
+                      <a:pPr algn="just"/>
+                      <a:r>
+                        <a:rPr lang="en-US" sz="1300" kern="100">
+                          <a:effectLst/>
+                        </a:rPr>
+                        <a:t>0.0010</a:t>
+                      </a:r>
+                      <a:endParaRPr lang="de-DE" sz="1100" kern="100">
+                        <a:effectLst/>
+                        <a:latin typeface="DengXian" panose="02010600030101010101" pitchFamily="2" charset="-122"/>
+                        <a:ea typeface="DengXian" panose="02010600030101010101" pitchFamily="2" charset="-122"/>
+                        <a:cs typeface="Arial" panose="020B0604020202020204" pitchFamily="34" charset="0"/>
+                      </a:endParaRPr>
+                    </a:p>
+                  </a:txBody>
+                  <a:tcPr marL="72384" marR="72384" marT="0" marB="0"/>
+                </a:tc>
+                <a:tc>
+                  <a:txBody>
+                    <a:bodyPr/>
+                    <a:lstStyle/>
+                    <a:p>
+                      <a:pPr algn="just"/>
+                      <a:r>
+                        <a:rPr lang="en-US" sz="1300" kern="100">
+                          <a:effectLst/>
+                        </a:rPr>
+                        <a:t>0.7176</a:t>
+                      </a:r>
+                      <a:endParaRPr lang="de-DE" sz="1100" kern="100">
+                        <a:effectLst/>
+                      </a:endParaRPr>
+                    </a:p>
+                    <a:p>
+                      <a:pPr algn="just"/>
+                      <a:r>
+                        <a:rPr lang="en-US" sz="1300" kern="100">
+                          <a:effectLst/>
+                        </a:rPr>
+                        <a:t> </a:t>
+                      </a:r>
+                      <a:endParaRPr lang="de-DE" sz="1100" kern="100">
+                        <a:effectLst/>
+                        <a:latin typeface="DengXian" panose="02010600030101010101" pitchFamily="2" charset="-122"/>
+                        <a:ea typeface="DengXian" panose="02010600030101010101" pitchFamily="2" charset="-122"/>
+                        <a:cs typeface="Arial" panose="020B0604020202020204" pitchFamily="34" charset="0"/>
+                      </a:endParaRPr>
+                    </a:p>
+                  </a:txBody>
+                  <a:tcPr marL="72384" marR="72384" marT="0" marB="0"/>
+                </a:tc>
+                <a:tc>
+                  <a:txBody>
+                    <a:bodyPr/>
+                    <a:lstStyle/>
+                    <a:p>
+                      <a:pPr algn="just"/>
+                      <a:r>
+                        <a:rPr lang="en-US" sz="1300" kern="100">
+                          <a:effectLst/>
+                        </a:rPr>
+                        <a:t>0.0373</a:t>
+                      </a:r>
+                      <a:endParaRPr lang="de-DE" sz="1100" kern="100">
+                        <a:effectLst/>
+                        <a:latin typeface="DengXian" panose="02010600030101010101" pitchFamily="2" charset="-122"/>
+                        <a:ea typeface="DengXian" panose="02010600030101010101" pitchFamily="2" charset="-122"/>
+                        <a:cs typeface="Arial" panose="020B0604020202020204" pitchFamily="34" charset="0"/>
+                      </a:endParaRPr>
+                    </a:p>
+                  </a:txBody>
+                  <a:tcPr marL="72384" marR="72384" marT="0" marB="0"/>
+                </a:tc>
+                <a:tc>
+                  <a:txBody>
+                    <a:bodyPr/>
+                    <a:lstStyle/>
+                    <a:p>
+                      <a:pPr algn="just"/>
+                      <a:r>
+                        <a:rPr lang="en-US" sz="1300" kern="100">
+                          <a:effectLst/>
+                        </a:rPr>
+                        <a:t>4.9715</a:t>
+                      </a:r>
+                      <a:r>
+                        <a:rPr lang="de-DE" sz="1100" kern="100">
+                          <a:effectLst/>
+                        </a:rPr>
+                        <a:t> </a:t>
+                      </a:r>
+                      <a:r>
+                        <a:rPr lang="en-US" sz="1300" kern="100">
+                          <a:effectLst/>
+                        </a:rPr>
+                        <a:t> </a:t>
+                      </a:r>
+                      <a:endParaRPr lang="de-DE" sz="1100" kern="100">
+                        <a:effectLst/>
+                        <a:latin typeface="DengXian" panose="02010600030101010101" pitchFamily="2" charset="-122"/>
+                        <a:ea typeface="DengXian" panose="02010600030101010101" pitchFamily="2" charset="-122"/>
+                        <a:cs typeface="Arial" panose="020B0604020202020204" pitchFamily="34" charset="0"/>
+                      </a:endParaRPr>
+                    </a:p>
+                  </a:txBody>
+                  <a:tcPr marL="72384" marR="72384" marT="0" marB="0"/>
+                </a:tc>
+                <a:extLst>
+                  <a:ext uri="{0D108BD9-81ED-4DB2-BD59-A6C34878D82A}">
+                    <a16:rowId xmlns:a16="http://schemas.microsoft.com/office/drawing/2014/main" val="2437706677"/>
+                  </a:ext>
+                </a:extLst>
+              </a:tr>
+              <a:tr h="231629">
+                <a:tc>
+                  <a:txBody>
+                    <a:bodyPr/>
+                    <a:lstStyle/>
+                    <a:p>
+                      <a:pPr algn="just"/>
+                      <a:r>
+                        <a:rPr lang="en-US" sz="1300" kern="100">
+                          <a:effectLst/>
+                        </a:rPr>
+                        <a:t>Early-Fusion</a:t>
+                      </a:r>
+                      <a:endParaRPr lang="de-DE" sz="1100" kern="100">
+                        <a:effectLst/>
+                        <a:latin typeface="DengXian" panose="02010600030101010101" pitchFamily="2" charset="-122"/>
+                        <a:ea typeface="DengXian" panose="02010600030101010101" pitchFamily="2" charset="-122"/>
+                        <a:cs typeface="Arial" panose="020B0604020202020204" pitchFamily="34" charset="0"/>
+                      </a:endParaRPr>
+                    </a:p>
+                  </a:txBody>
+                  <a:tcPr marL="72384" marR="72384" marT="0" marB="0"/>
+                </a:tc>
+                <a:tc>
+                  <a:txBody>
+                    <a:bodyPr/>
+                    <a:lstStyle/>
+                    <a:p>
+                      <a:pPr algn="just"/>
+                      <a:r>
+                        <a:rPr lang="en-US" sz="1300" kern="100">
+                          <a:effectLst/>
+                        </a:rPr>
+                        <a:t>0.3202</a:t>
+                      </a:r>
+                      <a:endParaRPr lang="de-DE" sz="1100" kern="100">
+                        <a:effectLst/>
+                        <a:latin typeface="DengXian" panose="02010600030101010101" pitchFamily="2" charset="-122"/>
+                        <a:ea typeface="DengXian" panose="02010600030101010101" pitchFamily="2" charset="-122"/>
+                        <a:cs typeface="Arial" panose="020B0604020202020204" pitchFamily="34" charset="0"/>
+                      </a:endParaRPr>
+                    </a:p>
+                  </a:txBody>
+                  <a:tcPr marL="72384" marR="72384" marT="0" marB="0"/>
+                </a:tc>
+                <a:tc>
+                  <a:txBody>
+                    <a:bodyPr/>
+                    <a:lstStyle/>
+                    <a:p>
+                      <a:pPr algn="just"/>
+                      <a:r>
+                        <a:rPr lang="en-US" sz="1300" kern="100">
+                          <a:effectLst/>
+                        </a:rPr>
+                        <a:t>0.0009</a:t>
+                      </a:r>
+                      <a:endParaRPr lang="de-DE" sz="1100" kern="100">
+                        <a:effectLst/>
+                        <a:latin typeface="DengXian" panose="02010600030101010101" pitchFamily="2" charset="-122"/>
+                        <a:ea typeface="DengXian" panose="02010600030101010101" pitchFamily="2" charset="-122"/>
+                        <a:cs typeface="Arial" panose="020B0604020202020204" pitchFamily="34" charset="0"/>
+                      </a:endParaRPr>
+                    </a:p>
+                  </a:txBody>
+                  <a:tcPr marL="72384" marR="72384" marT="0" marB="0"/>
+                </a:tc>
+                <a:tc>
+                  <a:txBody>
+                    <a:bodyPr/>
+                    <a:lstStyle/>
+                    <a:p>
+                      <a:pPr algn="just"/>
+                      <a:r>
+                        <a:rPr lang="en-US" sz="1300" kern="100" dirty="0">
+                          <a:effectLst/>
+                        </a:rPr>
+                        <a:t> </a:t>
+                      </a:r>
+                      <a:endParaRPr lang="de-DE" sz="1100" kern="100" dirty="0">
+                        <a:effectLst/>
+                        <a:latin typeface="DengXian" panose="02010600030101010101" pitchFamily="2" charset="-122"/>
+                        <a:ea typeface="DengXian" panose="02010600030101010101" pitchFamily="2" charset="-122"/>
+                        <a:cs typeface="Arial" panose="020B0604020202020204" pitchFamily="34" charset="0"/>
+                      </a:endParaRPr>
+                    </a:p>
+                  </a:txBody>
+                  <a:tcPr marL="72384" marR="72384" marT="0" marB="0"/>
+                </a:tc>
+                <a:tc>
+                  <a:txBody>
+                    <a:bodyPr/>
+                    <a:lstStyle/>
+                    <a:p>
+                      <a:pPr algn="just"/>
+                      <a:r>
+                        <a:rPr lang="en-US" sz="1300" kern="100">
+                          <a:effectLst/>
+                        </a:rPr>
+                        <a:t>0.0373</a:t>
+                      </a:r>
+                      <a:endParaRPr lang="de-DE" sz="1100" kern="100">
+                        <a:effectLst/>
+                        <a:latin typeface="DengXian" panose="02010600030101010101" pitchFamily="2" charset="-122"/>
+                        <a:ea typeface="DengXian" panose="02010600030101010101" pitchFamily="2" charset="-122"/>
+                        <a:cs typeface="Arial" panose="020B0604020202020204" pitchFamily="34" charset="0"/>
+                      </a:endParaRPr>
+                    </a:p>
+                  </a:txBody>
+                  <a:tcPr marL="72384" marR="72384" marT="0" marB="0"/>
+                </a:tc>
+                <a:tc>
+                  <a:txBody>
+                    <a:bodyPr/>
+                    <a:lstStyle/>
+                    <a:p>
+                      <a:pPr algn="just"/>
+                      <a:r>
+                        <a:rPr lang="en-US" sz="1300" kern="100">
+                          <a:effectLst/>
+                        </a:rPr>
+                        <a:t> </a:t>
+                      </a:r>
+                      <a:endParaRPr lang="de-DE" sz="1100" kern="100">
+                        <a:effectLst/>
+                        <a:latin typeface="DengXian" panose="02010600030101010101" pitchFamily="2" charset="-122"/>
+                        <a:ea typeface="DengXian" panose="02010600030101010101" pitchFamily="2" charset="-122"/>
+                        <a:cs typeface="Arial" panose="020B0604020202020204" pitchFamily="34" charset="0"/>
+                      </a:endParaRPr>
+                    </a:p>
+                  </a:txBody>
+                  <a:tcPr marL="72384" marR="72384" marT="0" marB="0"/>
+                </a:tc>
+                <a:extLst>
+                  <a:ext uri="{0D108BD9-81ED-4DB2-BD59-A6C34878D82A}">
+                    <a16:rowId xmlns:a16="http://schemas.microsoft.com/office/drawing/2014/main" val="656596174"/>
+                  </a:ext>
+                </a:extLst>
+              </a:tr>
+              <a:tr h="231629">
+                <a:tc>
+                  <a:txBody>
+                    <a:bodyPr/>
+                    <a:lstStyle/>
+                    <a:p>
+                      <a:pPr algn="just"/>
+                      <a:r>
+                        <a:rPr lang="en-US" sz="1300" kern="100">
+                          <a:effectLst/>
+                        </a:rPr>
+                        <a:t>Late-Fusion</a:t>
+                      </a:r>
+                      <a:endParaRPr lang="de-DE" sz="1100" kern="100">
+                        <a:effectLst/>
+                        <a:latin typeface="DengXian" panose="02010600030101010101" pitchFamily="2" charset="-122"/>
+                        <a:ea typeface="DengXian" panose="02010600030101010101" pitchFamily="2" charset="-122"/>
+                        <a:cs typeface="Arial" panose="020B0604020202020204" pitchFamily="34" charset="0"/>
+                      </a:endParaRPr>
+                    </a:p>
+                  </a:txBody>
+                  <a:tcPr marL="72384" marR="72384" marT="0" marB="0"/>
+                </a:tc>
+                <a:tc>
+                  <a:txBody>
+                    <a:bodyPr/>
+                    <a:lstStyle/>
+                    <a:p>
+                      <a:pPr algn="just"/>
+                      <a:r>
+                        <a:rPr lang="en-US" sz="1300" kern="100">
+                          <a:effectLst/>
+                        </a:rPr>
+                        <a:t>0.3301</a:t>
+                      </a:r>
+                      <a:endParaRPr lang="de-DE" sz="1100" kern="100">
+                        <a:effectLst/>
+                        <a:latin typeface="DengXian" panose="02010600030101010101" pitchFamily="2" charset="-122"/>
+                        <a:ea typeface="DengXian" panose="02010600030101010101" pitchFamily="2" charset="-122"/>
+                        <a:cs typeface="Arial" panose="020B0604020202020204" pitchFamily="34" charset="0"/>
+                      </a:endParaRPr>
+                    </a:p>
+                  </a:txBody>
+                  <a:tcPr marL="72384" marR="72384" marT="0" marB="0"/>
+                </a:tc>
+                <a:tc>
+                  <a:txBody>
+                    <a:bodyPr/>
+                    <a:lstStyle/>
+                    <a:p>
+                      <a:pPr algn="just"/>
+                      <a:r>
+                        <a:rPr lang="en-US" sz="1300" kern="100">
+                          <a:effectLst/>
+                        </a:rPr>
+                        <a:t>0.0009</a:t>
+                      </a:r>
+                      <a:endParaRPr lang="de-DE" sz="1100" kern="100">
+                        <a:effectLst/>
+                        <a:latin typeface="DengXian" panose="02010600030101010101" pitchFamily="2" charset="-122"/>
+                        <a:ea typeface="DengXian" panose="02010600030101010101" pitchFamily="2" charset="-122"/>
+                        <a:cs typeface="Arial" panose="020B0604020202020204" pitchFamily="34" charset="0"/>
+                      </a:endParaRPr>
+                    </a:p>
+                  </a:txBody>
+                  <a:tcPr marL="72384" marR="72384" marT="0" marB="0"/>
+                </a:tc>
+                <a:tc>
+                  <a:txBody>
+                    <a:bodyPr/>
+                    <a:lstStyle/>
+                    <a:p>
+                      <a:pPr algn="just"/>
+                      <a:r>
+                        <a:rPr lang="en-US" sz="1300" kern="100">
+                          <a:effectLst/>
+                        </a:rPr>
+                        <a:t> </a:t>
+                      </a:r>
+                      <a:endParaRPr lang="de-DE" sz="1100" kern="100">
+                        <a:effectLst/>
+                        <a:latin typeface="DengXian" panose="02010600030101010101" pitchFamily="2" charset="-122"/>
+                        <a:ea typeface="DengXian" panose="02010600030101010101" pitchFamily="2" charset="-122"/>
+                        <a:cs typeface="Arial" panose="020B0604020202020204" pitchFamily="34" charset="0"/>
+                      </a:endParaRPr>
+                    </a:p>
+                  </a:txBody>
+                  <a:tcPr marL="72384" marR="72384" marT="0" marB="0"/>
+                </a:tc>
+                <a:tc>
+                  <a:txBody>
+                    <a:bodyPr/>
+                    <a:lstStyle/>
+                    <a:p>
+                      <a:pPr algn="just"/>
+                      <a:r>
+                        <a:rPr lang="en-US" sz="1300" kern="100">
+                          <a:effectLst/>
+                        </a:rPr>
+                        <a:t>0.0373</a:t>
+                      </a:r>
+                      <a:endParaRPr lang="de-DE" sz="1100" kern="100">
+                        <a:effectLst/>
+                        <a:latin typeface="DengXian" panose="02010600030101010101" pitchFamily="2" charset="-122"/>
+                        <a:ea typeface="DengXian" panose="02010600030101010101" pitchFamily="2" charset="-122"/>
+                        <a:cs typeface="Arial" panose="020B0604020202020204" pitchFamily="34" charset="0"/>
+                      </a:endParaRPr>
+                    </a:p>
+                  </a:txBody>
+                  <a:tcPr marL="72384" marR="72384" marT="0" marB="0"/>
+                </a:tc>
+                <a:tc>
+                  <a:txBody>
+                    <a:bodyPr/>
+                    <a:lstStyle/>
+                    <a:p>
+                      <a:pPr algn="just"/>
+                      <a:r>
+                        <a:rPr lang="en-US" sz="1300" kern="100" dirty="0">
+                          <a:effectLst/>
+                        </a:rPr>
+                        <a:t> </a:t>
+                      </a:r>
+                      <a:endParaRPr lang="de-DE" sz="1100" kern="100" dirty="0">
+                        <a:effectLst/>
+                        <a:latin typeface="DengXian" panose="02010600030101010101" pitchFamily="2" charset="-122"/>
+                        <a:ea typeface="DengXian" panose="02010600030101010101" pitchFamily="2" charset="-122"/>
+                        <a:cs typeface="Arial" panose="020B0604020202020204" pitchFamily="34" charset="0"/>
+                      </a:endParaRPr>
+                    </a:p>
+                  </a:txBody>
+                  <a:tcPr marL="72384" marR="72384" marT="0" marB="0"/>
+                </a:tc>
+                <a:extLst>
+                  <a:ext uri="{0D108BD9-81ED-4DB2-BD59-A6C34878D82A}">
+                    <a16:rowId xmlns:a16="http://schemas.microsoft.com/office/drawing/2014/main" val="3812417479"/>
+                  </a:ext>
+                </a:extLst>
+              </a:tr>
+            </a:tbl>
+          </a:graphicData>
+        </a:graphic>
+      </p:graphicFrame>
     </p:spTree>
     <p:extLst>
       <p:ext uri="{BB962C8B-B14F-4D97-AF65-F5344CB8AC3E}">
@@ -15920,7 +17803,18 @@
             <a:pPr marL="0" indent="0">
               <a:buNone/>
             </a:pPr>
-            <a:endParaRPr lang="en-US" sz="1600" dirty="0"/>
+            <a:r>
+              <a:rPr lang="en-US" b="1" dirty="0"/>
+              <a:t>best avg. </a:t>
+            </a:r>
+            <a:r>
+              <a:rPr lang="en-US" b="1" dirty="0" err="1"/>
+              <a:t>nDCG</a:t>
+            </a:r>
+            <a:r>
+              <a:rPr lang="en-US" b="1" dirty="0"/>
+              <a:t>: </a:t>
+            </a:r>
           </a:p>
           <a:p>
             <a:pPr marL="0" indent="0">
@@ -16049,6 +17943,122 @@
         <p:txBody>
           <a:bodyPr/>
           <a:lstStyle/>
+          <a:p>
+            <a:pPr algn="just">
+              <a:lnSpc>
+                <a:spcPct val="110000"/>
+              </a:lnSpc>
+            </a:pPr>
+            <a:r>
+              <a:rPr lang="en-US" sz="1800" dirty="0"/>
+              <a:t>DataStax. „What Is Cosine Similarity? A Comprehensive Guide“. </a:t>
+            </a:r>
+            <a:r>
+              <a:rPr lang="en-US" sz="1800" dirty="0" err="1"/>
+              <a:t>Zugegriffen</a:t>
+            </a:r>
+            <a:r>
+              <a:rPr lang="en-US" sz="1800" dirty="0"/>
+              <a:t> 17. </a:t>
+            </a:r>
+            <a:r>
+              <a:rPr lang="en-US" sz="1800" dirty="0" err="1"/>
+              <a:t>Januar</a:t>
+            </a:r>
+            <a:r>
+              <a:rPr lang="en-US" sz="1800" dirty="0"/>
+              <a:t> 2024. </a:t>
+            </a:r>
+            <a:r>
+              <a:rPr lang="en-US" sz="1800" dirty="0">
+                <a:hlinkClick r:id="rId2"/>
+              </a:rPr>
+              <a:t>https://www.datastax.com/guides/what-is-cosine-similarity</a:t>
+            </a:r>
+            <a:r>
+              <a:rPr lang="en-US" sz="1800" dirty="0"/>
+              <a:t>.</a:t>
+            </a:r>
+          </a:p>
+          <a:p>
+            <a:pPr marL="0" indent="0" algn="just">
+              <a:lnSpc>
+                <a:spcPct val="110000"/>
+              </a:lnSpc>
+              <a:buNone/>
+            </a:pPr>
+            <a:endParaRPr lang="en-US" dirty="0"/>
+          </a:p>
+          <a:p>
+            <a:r>
+              <a:rPr lang="de-DE" dirty="0" err="1"/>
+              <a:t>Depeursinge</a:t>
+            </a:r>
+            <a:r>
+              <a:rPr lang="de-DE" dirty="0"/>
+              <a:t>, Adrien, und Henning Müller. „Fusion </a:t>
+            </a:r>
+            <a:r>
+              <a:rPr lang="de-DE" dirty="0" err="1"/>
+              <a:t>Techniques</a:t>
+            </a:r>
+            <a:r>
+              <a:rPr lang="de-DE" dirty="0"/>
+              <a:t> </a:t>
+            </a:r>
+            <a:r>
+              <a:rPr lang="de-DE" dirty="0" err="1"/>
+              <a:t>for</a:t>
+            </a:r>
+            <a:r>
+              <a:rPr lang="de-DE" dirty="0"/>
+              <a:t> </a:t>
+            </a:r>
+            <a:r>
+              <a:rPr lang="de-DE" dirty="0" err="1"/>
+              <a:t>Combining</a:t>
+            </a:r>
+            <a:r>
+              <a:rPr lang="de-DE" dirty="0"/>
+              <a:t> </a:t>
+            </a:r>
+            <a:r>
+              <a:rPr lang="de-DE" dirty="0" err="1"/>
+              <a:t>Textual</a:t>
+            </a:r>
+            <a:r>
+              <a:rPr lang="de-DE" dirty="0"/>
+              <a:t> and Visual Information Retrieval“. In </a:t>
+            </a:r>
+            <a:r>
+              <a:rPr lang="de-DE" i="1" dirty="0" err="1"/>
+              <a:t>ImageCLEF</a:t>
+            </a:r>
+            <a:r>
+              <a:rPr lang="de-DE" i="1" dirty="0"/>
+              <a:t>: Experimental Evaluation in Visual Information Retrieval</a:t>
+            </a:r>
+            <a:r>
+              <a:rPr lang="de-DE" dirty="0"/>
+              <a:t>, herausgegeben von Henning Müller, Paul Clough, Thomas Deselaers, und Barbara Caputo, 95–114. Berlin, Heidelberg: Springer Berlin Heidelberg, 2010. </a:t>
+            </a:r>
+            <a:r>
+              <a:rPr lang="de-DE" dirty="0">
+                <a:hlinkClick r:id="rId3"/>
+              </a:rPr>
+              <a:t>https://doi.org/10.1007/978-3-642-15181-1_6</a:t>
+            </a:r>
+            <a:r>
+              <a:rPr lang="de-DE" dirty="0"/>
+              <a:t>.</a:t>
+            </a:r>
+          </a:p>
+          <a:p>
+            <a:pPr marL="0" indent="0">
+              <a:buNone/>
+            </a:pPr>
+            <a:endParaRPr lang="en-US" dirty="0"/>
+          </a:p>
           <a:p>
             <a:endParaRPr lang="de-DE" dirty="0"/>
           </a:p>
@@ -16761,7 +18771,7 @@
         <p:spPr>
           <a:xfrm>
             <a:off x="674703" y="1349406"/>
-            <a:ext cx="10164932" cy="2308324"/>
+            <a:ext cx="10164932" cy="3139321"/>
           </a:xfrm>
           <a:prstGeom prst="rect">
             <a:avLst/>
@@ -16817,22 +18827,6 @@
             </a:pPr>
             <a:r>
               <a:rPr lang="de-AT" dirty="0" err="1"/>
-              <a:t>It</a:t>
-            </a:r>
-            <a:r>
-              <a:rPr lang="de-AT" dirty="0"/>
-              <a:t> </a:t>
-            </a:r>
-            <a:r>
-              <a:rPr lang="de-AT" dirty="0" err="1"/>
-              <a:t>is</a:t>
-            </a:r>
-            <a:r>
-              <a:rPr lang="de-AT" dirty="0"/>
-              <a:t> </a:t>
-            </a:r>
-            <a:r>
-              <a:rPr lang="de-AT" dirty="0" err="1"/>
               <a:t>scale</a:t>
             </a:r>
             <a:r>
@@ -16859,11 +18853,19 @@
             </a:r>
             <a:r>
               <a:rPr lang="de-AT" dirty="0"/>
-              <a:t> (</a:t>
+              <a:t> (PCA </a:t>
             </a:r>
             <a:r>
               <a:rPr lang="de-AT" dirty="0" err="1"/>
-              <a:t>because</a:t>
+              <a:t>used</a:t>
+            </a:r>
+            <a:r>
+              <a:rPr lang="de-AT" dirty="0"/>
+              <a:t> in </a:t>
+            </a:r>
+            <a:r>
+              <a:rPr lang="de-AT" dirty="0" err="1"/>
+              <a:t>early</a:t>
             </a:r>
             <a:r>
               <a:rPr lang="de-AT" dirty="0"/>
@@ -16871,23 +18873,7 @@
             </a:r>
             <a:r>
               <a:rPr lang="de-AT" dirty="0" err="1"/>
-              <a:t>we</a:t>
-            </a:r>
-            <a:r>
-              <a:rPr lang="de-AT" dirty="0"/>
-              <a:t> </a:t>
-            </a:r>
-            <a:r>
-              <a:rPr lang="de-AT" dirty="0" err="1"/>
-              <a:t>used</a:t>
-            </a:r>
-            <a:r>
-              <a:rPr lang="de-AT" dirty="0"/>
-              <a:t> PCA -&gt; TODO: Further </a:t>
-            </a:r>
-            <a:r>
-              <a:rPr lang="de-AT" dirty="0" err="1"/>
-              <a:t>explaination</a:t>
+              <a:t>fusion</a:t>
             </a:r>
             <a:r>
               <a:rPr lang="de-AT" dirty="0"/>
@@ -16903,7 +18889,10 @@
               <a:rPr lang="de-AT" dirty="0" err="1"/>
               <a:t>Simplicity</a:t>
             </a:r>
-            <a:endParaRPr lang="de-AT" dirty="0"/>
+            <a:r>
+              <a:rPr lang="de-AT" dirty="0"/>
+              <a:t> </a:t>
+            </a:r>
           </a:p>
           <a:p>
             <a:pPr marL="285750" indent="-285750">
@@ -16962,6 +18951,77 @@
               <a:rPr lang="de-AT" dirty="0" err="1"/>
               <a:t>analysis</a:t>
             </a:r>
+            <a:endParaRPr lang="de-AT" dirty="0"/>
+          </a:p>
+          <a:p>
+            <a:pPr marL="285750" indent="-285750">
+              <a:buFont typeface="Arial" panose="020B0604020202020204" pitchFamily="34" charset="0"/>
+              <a:buChar char="•"/>
+            </a:pPr>
+            <a:r>
+              <a:rPr lang="de-AT" dirty="0" err="1"/>
+              <a:t>Useful</a:t>
+            </a:r>
+            <a:r>
+              <a:rPr lang="de-AT" dirty="0"/>
+              <a:t> </a:t>
+            </a:r>
+            <a:r>
+              <a:rPr lang="de-AT" dirty="0" err="1"/>
+              <a:t>for</a:t>
+            </a:r>
+            <a:r>
+              <a:rPr lang="de-AT" dirty="0"/>
+              <a:t> </a:t>
+            </a:r>
+            <a:r>
+              <a:rPr lang="de-AT" dirty="0" err="1"/>
+              <a:t>vectorization</a:t>
+            </a:r>
+            <a:r>
+              <a:rPr lang="de-AT" dirty="0"/>
+              <a:t> (</a:t>
+            </a:r>
+            <a:r>
+              <a:rPr lang="de-AT" dirty="0" err="1"/>
+              <a:t>cosine</a:t>
+            </a:r>
+            <a:r>
+              <a:rPr lang="de-AT" dirty="0"/>
+              <a:t> </a:t>
+            </a:r>
+            <a:r>
+              <a:rPr lang="de-AT" dirty="0" err="1"/>
+              <a:t>similarity</a:t>
+            </a:r>
+            <a:r>
+              <a:rPr lang="de-AT" dirty="0"/>
+              <a:t> </a:t>
+            </a:r>
+            <a:r>
+              <a:rPr lang="de-AT" dirty="0" err="1"/>
+              <a:t>matrix</a:t>
+            </a:r>
+            <a:r>
+              <a:rPr lang="de-AT" dirty="0"/>
+              <a:t>)</a:t>
+            </a:r>
+          </a:p>
+          <a:p>
+            <a:pPr marL="285750" indent="-285750">
+              <a:buFont typeface="Arial" panose="020B0604020202020204" pitchFamily="34" charset="0"/>
+              <a:buChar char="•"/>
+            </a:pPr>
+            <a:r>
+              <a:rPr lang="en-US" dirty="0"/>
+              <a:t>No significant difference to Euclidean distance </a:t>
+            </a:r>
+          </a:p>
+          <a:p>
+            <a:pPr marL="285750" indent="-285750">
+              <a:buFont typeface="Arial" panose="020B0604020202020204" pitchFamily="34" charset="0"/>
+              <a:buChar char="•"/>
+            </a:pPr>
             <a:endParaRPr lang="de-AT" dirty="0"/>
           </a:p>
         </p:txBody>
@@ -17075,7 +19135,7 @@
         <p:spPr>
           <a:xfrm>
             <a:off x="780176" y="1291905"/>
-            <a:ext cx="9605395" cy="923330"/>
+            <a:ext cx="9605395" cy="1754326"/>
           </a:xfrm>
           <a:prstGeom prst="rect">
             <a:avLst/>
@@ -17088,55 +19148,58 @@
           </a:bodyPr>
           <a:lstStyle/>
           <a:p>
+            <a:pPr marL="285750" indent="-285750">
+              <a:buFont typeface="Arial" panose="020B0604020202020204" pitchFamily="34" charset="0"/>
+              <a:buChar char="•"/>
+            </a:pPr>
             <a:r>
               <a:rPr lang="en-US" dirty="0"/>
-              <a:t>To improve the performance, when calculating the evaluation measures over all possible query tracks we created a cosine-similarity matrix which accelerated the execution of the code immensely</a:t>
-            </a:r>
+              <a:t>First calculate similarity of all queries to all queries</a:t>
+            </a:r>
+          </a:p>
+          <a:p>
+            <a:pPr marL="285750" indent="-285750">
+              <a:buFont typeface="Arial" panose="020B0604020202020204" pitchFamily="34" charset="0"/>
+              <a:buChar char="•"/>
+            </a:pPr>
+            <a:r>
+              <a:rPr lang="en-US" dirty="0"/>
+              <a:t>Save as cosine similarity matrix</a:t>
+            </a:r>
+          </a:p>
+          <a:p>
+            <a:pPr marL="285750" indent="-285750">
+              <a:buFont typeface="Arial" panose="020B0604020202020204" pitchFamily="34" charset="0"/>
+              <a:buChar char="•"/>
+            </a:pPr>
+            <a:r>
+              <a:rPr lang="en-US" dirty="0"/>
+              <a:t>Reuse similarity matrix for all queries</a:t>
+            </a:r>
+          </a:p>
+          <a:p>
+            <a:pPr marL="285750" indent="-285750">
+              <a:buFont typeface="Arial" panose="020B0604020202020204" pitchFamily="34" charset="0"/>
+              <a:buChar char="•"/>
+            </a:pPr>
+            <a:r>
+              <a:rPr lang="en-US" dirty="0"/>
+              <a:t>Performance improvement </a:t>
+            </a:r>
+          </a:p>
+          <a:p>
+            <a:pPr marL="285750" indent="-285750">
+              <a:buFont typeface="Arial" panose="020B0604020202020204" pitchFamily="34" charset="0"/>
+              <a:buChar char="•"/>
+            </a:pPr>
+            <a:endParaRPr lang="en-US" dirty="0"/>
+          </a:p>
+          <a:p>
+            <a:pPr marL="285750" indent="-285750">
+              <a:buFont typeface="Arial" panose="020B0604020202020204" pitchFamily="34" charset="0"/>
+              <a:buChar char="•"/>
+            </a:pPr>
             <a:endParaRPr lang="de-DE" dirty="0"/>
-          </a:p>
-        </p:txBody>
-      </p:sp>
-      <p:sp>
-        <p:nvSpPr>
-          <p:cNvPr id="4" name="Textfeld 3">
-            <a:extLst>
-              <a:ext uri="{FF2B5EF4-FFF2-40B4-BE49-F238E27FC236}">
-                <a16:creationId xmlns:a16="http://schemas.microsoft.com/office/drawing/2014/main" id="{82F31FE6-F815-4353-DD9B-3DAADBEFB107}"/>
-              </a:ext>
-            </a:extLst>
-          </p:cNvPr>
-          <p:cNvSpPr txBox="1"/>
-          <p:nvPr/>
-        </p:nvSpPr>
-        <p:spPr>
-          <a:xfrm>
-            <a:off x="989901" y="2097248"/>
-            <a:ext cx="9395670" cy="369332"/>
-          </a:xfrm>
-          <a:prstGeom prst="rect">
-            <a:avLst/>
-          </a:prstGeom>
-          <a:noFill/>
-        </p:spPr>
-        <p:txBody>
-          <a:bodyPr wrap="square" rtlCol="0">
-            <a:spAutoFit/>
-          </a:bodyPr>
-          <a:lstStyle/>
-          <a:p>
-            <a:r>
-              <a:rPr lang="en-US" dirty="0">
-                <a:solidFill>
-                  <a:srgbClr val="FF0000"/>
-                </a:solidFill>
-              </a:rPr>
-              <a:t>TODO: Add explanation of Cosine-Similarity Matrix</a:t>
-            </a:r>
-            <a:endParaRPr lang="de-DE" dirty="0">
-              <a:solidFill>
-                <a:srgbClr val="FF0000"/>
-              </a:solidFill>
-            </a:endParaRPr>
           </a:p>
         </p:txBody>
       </p:sp>
@@ -17214,7 +19277,7 @@
         <p:spPr>
           <a:xfrm>
             <a:off x="713064" y="1191237"/>
-            <a:ext cx="9865453" cy="5940088"/>
+            <a:ext cx="9865453" cy="4893647"/>
           </a:xfrm>
           <a:prstGeom prst="rect">
             <a:avLst/>
@@ -17329,21 +19392,6 @@
               <a:buFont typeface="Arial" panose="020B0604020202020204" pitchFamily="34" charset="0"/>
               <a:buChar char="•"/>
             </a:pPr>
-            <a:endParaRPr lang="en-US" dirty="0"/>
-          </a:p>
-          <a:p>
-            <a:r>
-              <a:rPr lang="en-US" dirty="0"/>
-              <a:t>We did not notice a significant difference in the results, as well as precision and recall when </a:t>
-            </a:r>
-          </a:p>
-          <a:p>
-            <a:r>
-              <a:rPr lang="en-US" dirty="0"/>
-              <a:t>Running these functions with the Euclidean-distance similarity measure. </a:t>
-            </a:r>
-          </a:p>
-          <a:p>
             <a:endParaRPr lang="en-US" dirty="0"/>
           </a:p>
           <a:p>
@@ -17374,7 +19422,7 @@
 </file>
 
 <file path=ppt/slides/slide8.xml><?xml version="1.0" encoding="utf-8"?>
-<p:sld xmlns:a="http://schemas.openxmlformats.org/drawingml/2006/main" xmlns:r="http://schemas.openxmlformats.org/officeDocument/2006/relationships" xmlns:p="http://schemas.openxmlformats.org/presentationml/2006/main">
+<p:sld xmlns:a="http://schemas.openxmlformats.org/drawingml/2006/main" xmlns:r="http://schemas.openxmlformats.org/officeDocument/2006/relationships" xmlns:p="http://schemas.openxmlformats.org/presentationml/2006/main" show="0">
   <p:cSld>
     <p:spTree>
       <p:nvGrpSpPr>
@@ -18679,7 +20727,7 @@
 </file>
 
 <file path=ppt/slides/slide9.xml><?xml version="1.0" encoding="utf-8"?>
-<p:sld xmlns:a="http://schemas.openxmlformats.org/drawingml/2006/main" xmlns:r="http://schemas.openxmlformats.org/officeDocument/2006/relationships" xmlns:p="http://schemas.openxmlformats.org/presentationml/2006/main">
+<p:sld xmlns:a="http://schemas.openxmlformats.org/drawingml/2006/main" xmlns:r="http://schemas.openxmlformats.org/officeDocument/2006/relationships" xmlns:p="http://schemas.openxmlformats.org/presentationml/2006/main" show="0">
   <p:cSld>
     <p:spTree>
       <p:nvGrpSpPr>

</xml_diff>